<commit_message>
update README.md and PPT
</commit_message>
<xml_diff>
--- a/document/项目流程图.pptx
+++ b/document/项目流程图.pptx
@@ -5,10 +5,11 @@
     <p:sldMasterId id="2147483648" r:id="rId1"/>
   </p:sldMasterIdLst>
   <p:sldIdLst>
-    <p:sldId id="257" r:id="rId2"/>
-    <p:sldId id="256" r:id="rId3"/>
-    <p:sldId id="259" r:id="rId4"/>
+    <p:sldId id="260" r:id="rId2"/>
+    <p:sldId id="261" r:id="rId3"/>
+    <p:sldId id="262" r:id="rId4"/>
     <p:sldId id="258" r:id="rId5"/>
+    <p:sldId id="263" r:id="rId6"/>
   </p:sldIdLst>
   <p:sldSz cx="12192000" cy="6858000"/>
   <p:notesSz cx="6858000" cy="9144000"/>
@@ -262,7 +263,7 @@
           <a:p>
             <a:fld id="{66EF8DDB-2348-4EF6-83FF-6C766DD7F9EA}" type="datetimeFigureOut">
               <a:rPr lang="zh-CN" altLang="en-US" smtClean="0"/>
-              <a:t>2021/12/23</a:t>
+              <a:t>2023/3/26</a:t>
             </a:fld>
             <a:endParaRPr lang="zh-CN" altLang="en-US"/>
           </a:p>
@@ -460,7 +461,7 @@
           <a:p>
             <a:fld id="{66EF8DDB-2348-4EF6-83FF-6C766DD7F9EA}" type="datetimeFigureOut">
               <a:rPr lang="zh-CN" altLang="en-US" smtClean="0"/>
-              <a:t>2021/12/23</a:t>
+              <a:t>2023/3/26</a:t>
             </a:fld>
             <a:endParaRPr lang="zh-CN" altLang="en-US"/>
           </a:p>
@@ -668,7 +669,7 @@
           <a:p>
             <a:fld id="{66EF8DDB-2348-4EF6-83FF-6C766DD7F9EA}" type="datetimeFigureOut">
               <a:rPr lang="zh-CN" altLang="en-US" smtClean="0"/>
-              <a:t>2021/12/23</a:t>
+              <a:t>2023/3/26</a:t>
             </a:fld>
             <a:endParaRPr lang="zh-CN" altLang="en-US"/>
           </a:p>
@@ -866,7 +867,7 @@
           <a:p>
             <a:fld id="{66EF8DDB-2348-4EF6-83FF-6C766DD7F9EA}" type="datetimeFigureOut">
               <a:rPr lang="zh-CN" altLang="en-US" smtClean="0"/>
-              <a:t>2021/12/23</a:t>
+              <a:t>2023/3/26</a:t>
             </a:fld>
             <a:endParaRPr lang="zh-CN" altLang="en-US"/>
           </a:p>
@@ -1141,7 +1142,7 @@
           <a:p>
             <a:fld id="{66EF8DDB-2348-4EF6-83FF-6C766DD7F9EA}" type="datetimeFigureOut">
               <a:rPr lang="zh-CN" altLang="en-US" smtClean="0"/>
-              <a:t>2021/12/23</a:t>
+              <a:t>2023/3/26</a:t>
             </a:fld>
             <a:endParaRPr lang="zh-CN" altLang="en-US"/>
           </a:p>
@@ -1406,7 +1407,7 @@
           <a:p>
             <a:fld id="{66EF8DDB-2348-4EF6-83FF-6C766DD7F9EA}" type="datetimeFigureOut">
               <a:rPr lang="zh-CN" altLang="en-US" smtClean="0"/>
-              <a:t>2021/12/23</a:t>
+              <a:t>2023/3/26</a:t>
             </a:fld>
             <a:endParaRPr lang="zh-CN" altLang="en-US"/>
           </a:p>
@@ -1818,7 +1819,7 @@
           <a:p>
             <a:fld id="{66EF8DDB-2348-4EF6-83FF-6C766DD7F9EA}" type="datetimeFigureOut">
               <a:rPr lang="zh-CN" altLang="en-US" smtClean="0"/>
-              <a:t>2021/12/23</a:t>
+              <a:t>2023/3/26</a:t>
             </a:fld>
             <a:endParaRPr lang="zh-CN" altLang="en-US"/>
           </a:p>
@@ -1959,7 +1960,7 @@
           <a:p>
             <a:fld id="{66EF8DDB-2348-4EF6-83FF-6C766DD7F9EA}" type="datetimeFigureOut">
               <a:rPr lang="zh-CN" altLang="en-US" smtClean="0"/>
-              <a:t>2021/12/23</a:t>
+              <a:t>2023/3/26</a:t>
             </a:fld>
             <a:endParaRPr lang="zh-CN" altLang="en-US"/>
           </a:p>
@@ -2072,7 +2073,7 @@
           <a:p>
             <a:fld id="{66EF8DDB-2348-4EF6-83FF-6C766DD7F9EA}" type="datetimeFigureOut">
               <a:rPr lang="zh-CN" altLang="en-US" smtClean="0"/>
-              <a:t>2021/12/23</a:t>
+              <a:t>2023/3/26</a:t>
             </a:fld>
             <a:endParaRPr lang="zh-CN" altLang="en-US"/>
           </a:p>
@@ -2383,7 +2384,7 @@
           <a:p>
             <a:fld id="{66EF8DDB-2348-4EF6-83FF-6C766DD7F9EA}" type="datetimeFigureOut">
               <a:rPr lang="zh-CN" altLang="en-US" smtClean="0"/>
-              <a:t>2021/12/23</a:t>
+              <a:t>2023/3/26</a:t>
             </a:fld>
             <a:endParaRPr lang="zh-CN" altLang="en-US"/>
           </a:p>
@@ -2671,7 +2672,7 @@
           <a:p>
             <a:fld id="{66EF8DDB-2348-4EF6-83FF-6C766DD7F9EA}" type="datetimeFigureOut">
               <a:rPr lang="zh-CN" altLang="en-US" smtClean="0"/>
-              <a:t>2021/12/23</a:t>
+              <a:t>2023/3/26</a:t>
             </a:fld>
             <a:endParaRPr lang="zh-CN" altLang="en-US"/>
           </a:p>
@@ -2912,7 +2913,7 @@
           <a:p>
             <a:fld id="{66EF8DDB-2348-4EF6-83FF-6C766DD7F9EA}" type="datetimeFigureOut">
               <a:rPr lang="zh-CN" altLang="en-US" smtClean="0"/>
-              <a:t>2021/12/23</a:t>
+              <a:t>2023/3/26</a:t>
             </a:fld>
             <a:endParaRPr lang="zh-CN" altLang="en-US"/>
           </a:p>
@@ -3343,7 +3344,7 @@
         </p:nvSpPr>
         <p:spPr>
           <a:xfrm>
-            <a:off x="5234940" y="247360"/>
+            <a:off x="5145361" y="107033"/>
             <a:ext cx="1722120" cy="523220"/>
           </a:xfrm>
           <a:prstGeom prst="rect">
@@ -3359,8 +3360,8 @@
           <a:p>
             <a:r>
               <a:rPr lang="zh-CN" altLang="en-US" sz="2800" b="1" dirty="0">
-                <a:latin typeface="黑体" panose="02010609060101010101" pitchFamily="49" charset="-122"/>
-                <a:ea typeface="黑体" panose="02010609060101010101" pitchFamily="49" charset="-122"/>
+                <a:latin typeface="宋体" panose="02010600030101010101" pitchFamily="2" charset="-122"/>
+                <a:ea typeface="宋体" panose="02010600030101010101" pitchFamily="2" charset="-122"/>
                 <a:cs typeface="Times New Roman" panose="02020603050405020304" pitchFamily="18" charset="0"/>
               </a:rPr>
               <a:t>总体流程</a:t>
@@ -3389,6 +3390,11 @@
             <a:avLst/>
           </a:prstGeom>
           <a:noFill/>
+          <a:ln w="28575">
+            <a:solidFill>
+              <a:schemeClr val="tx1"/>
+            </a:solidFill>
+          </a:ln>
         </p:spPr>
         <p:style>
           <a:lnRef idx="2">
@@ -3411,7 +3417,10 @@
           <a:lstStyle/>
           <a:p>
             <a:pPr algn="ctr"/>
-            <a:endParaRPr lang="zh-CN" altLang="en-US"/>
+            <a:endParaRPr lang="zh-CN" altLang="en-US">
+              <a:latin typeface="宋体" panose="02010600030101010101" pitchFamily="2" charset="-122"/>
+              <a:ea typeface="宋体" panose="02010600030101010101" pitchFamily="2" charset="-122"/>
+            </a:endParaRPr>
           </a:p>
         </p:txBody>
       </p:sp>
@@ -3429,12 +3438,18 @@
         </p:nvSpPr>
         <p:spPr>
           <a:xfrm>
-            <a:off x="1714500" y="3074960"/>
-            <a:ext cx="1912620" cy="1120140"/>
+            <a:off x="1666516" y="3074073"/>
+            <a:ext cx="1840926" cy="1126680"/>
           </a:xfrm>
           <a:prstGeom prst="roundRect">
             <a:avLst/>
           </a:prstGeom>
+          <a:noFill/>
+          <a:ln w="19050">
+            <a:solidFill>
+              <a:schemeClr val="tx1"/>
+            </a:solidFill>
+          </a:ln>
         </p:spPr>
         <p:style>
           <a:lnRef idx="2">
@@ -3462,6 +3477,9 @@
                 <a:solidFill>
                   <a:schemeClr val="tx1"/>
                 </a:solidFill>
+                <a:latin typeface="Times New Roman" panose="02020603050405020304" pitchFamily="18" charset="0"/>
+                <a:ea typeface="宋体" panose="02010600030101010101" pitchFamily="2" charset="-122"/>
+                <a:cs typeface="Times New Roman" panose="02020603050405020304" pitchFamily="18" charset="0"/>
               </a:rPr>
               <a:t>DeepStream</a:t>
             </a:r>
@@ -3473,6 +3491,8 @@
                 <a:solidFill>
                   <a:schemeClr val="tx1"/>
                 </a:solidFill>
+                <a:latin typeface="宋体" panose="02010600030101010101" pitchFamily="2" charset="-122"/>
+                <a:ea typeface="宋体" panose="02010600030101010101" pitchFamily="2" charset="-122"/>
               </a:rPr>
               <a:t>管道</a:t>
             </a:r>
@@ -3499,6 +3519,12 @@
           <a:prstGeom prst="roundRect">
             <a:avLst/>
           </a:prstGeom>
+          <a:noFill/>
+          <a:ln w="19050">
+            <a:solidFill>
+              <a:schemeClr val="tx1"/>
+            </a:solidFill>
+          </a:ln>
         </p:spPr>
         <p:style>
           <a:lnRef idx="2">
@@ -3526,6 +3552,8 @@
                 <a:solidFill>
                   <a:schemeClr val="tx1"/>
                 </a:solidFill>
+                <a:latin typeface="宋体" panose="02010600030101010101" pitchFamily="2" charset="-122"/>
+                <a:ea typeface="宋体" panose="02010600030101010101" pitchFamily="2" charset="-122"/>
               </a:rPr>
               <a:t>文件保存模块</a:t>
             </a:r>
@@ -3552,6 +3580,12 @@
           <a:prstGeom prst="roundRect">
             <a:avLst/>
           </a:prstGeom>
+          <a:noFill/>
+          <a:ln w="19050">
+            <a:solidFill>
+              <a:schemeClr val="tx1"/>
+            </a:solidFill>
+          </a:ln>
         </p:spPr>
         <p:style>
           <a:lnRef idx="2">
@@ -3579,6 +3613,8 @@
                 <a:solidFill>
                   <a:schemeClr val="tx1"/>
                 </a:solidFill>
+                <a:latin typeface="宋体" panose="02010600030101010101" pitchFamily="2" charset="-122"/>
+                <a:ea typeface="宋体" panose="02010600030101010101" pitchFamily="2" charset="-122"/>
               </a:rPr>
               <a:t>MQTT</a:t>
             </a:r>
@@ -3587,6 +3623,8 @@
                 <a:solidFill>
                   <a:schemeClr val="tx1"/>
                 </a:solidFill>
+                <a:latin typeface="宋体" panose="02010600030101010101" pitchFamily="2" charset="-122"/>
+                <a:ea typeface="宋体" panose="02010600030101010101" pitchFamily="2" charset="-122"/>
               </a:rPr>
               <a:t>模块</a:t>
             </a:r>
@@ -3607,16 +3645,27 @@
         </p:nvSpPr>
         <p:spPr>
           <a:xfrm rot="5400000">
-            <a:off x="2836544" y="4444657"/>
-            <a:ext cx="1215390" cy="716281"/>
+            <a:off x="2548486" y="4155613"/>
+            <a:ext cx="1194662" cy="1284942"/>
           </a:xfrm>
           <a:prstGeom prst="bentUpArrow">
             <a:avLst>
-              <a:gd name="adj1" fmla="val 25000"/>
-              <a:gd name="adj2" fmla="val 25000"/>
-              <a:gd name="adj3" fmla="val 32477"/>
+              <a:gd name="adj1" fmla="val 17346"/>
+              <a:gd name="adj2" fmla="val 19259"/>
+              <a:gd name="adj3" fmla="val 22272"/>
             </a:avLst>
           </a:prstGeom>
+          <a:solidFill>
+            <a:schemeClr val="accent5">
+              <a:lumMod val="60000"/>
+              <a:lumOff val="40000"/>
+            </a:schemeClr>
+          </a:solidFill>
+          <a:ln>
+            <a:solidFill>
+              <a:schemeClr val="tx1"/>
+            </a:solidFill>
+          </a:ln>
         </p:spPr>
         <p:style>
           <a:lnRef idx="2">
@@ -3639,7 +3688,10 @@
           <a:lstStyle/>
           <a:p>
             <a:pPr algn="ctr"/>
-            <a:endParaRPr lang="zh-CN" altLang="en-US"/>
+            <a:endParaRPr lang="zh-CN" altLang="en-US">
+              <a:latin typeface="宋体" panose="02010600030101010101" pitchFamily="2" charset="-122"/>
+              <a:ea typeface="宋体" panose="02010600030101010101" pitchFamily="2" charset="-122"/>
+            </a:endParaRPr>
           </a:p>
         </p:txBody>
       </p:sp>
@@ -3663,6 +3715,12 @@
           <a:prstGeom prst="roundRect">
             <a:avLst/>
           </a:prstGeom>
+          <a:noFill/>
+          <a:ln w="19050">
+            <a:solidFill>
+              <a:schemeClr val="tx1"/>
+            </a:solidFill>
+          </a:ln>
         </p:spPr>
         <p:style>
           <a:lnRef idx="2">
@@ -3690,6 +3748,8 @@
                 <a:solidFill>
                   <a:schemeClr val="tx1"/>
                 </a:solidFill>
+                <a:latin typeface="宋体" panose="02010600030101010101" pitchFamily="2" charset="-122"/>
+                <a:ea typeface="宋体" panose="02010600030101010101" pitchFamily="2" charset="-122"/>
               </a:rPr>
               <a:t>UDP</a:t>
             </a:r>
@@ -3698,6 +3758,8 @@
                 <a:solidFill>
                   <a:schemeClr val="tx1"/>
                 </a:solidFill>
+                <a:latin typeface="宋体" panose="02010600030101010101" pitchFamily="2" charset="-122"/>
+                <a:ea typeface="宋体" panose="02010600030101010101" pitchFamily="2" charset="-122"/>
               </a:rPr>
               <a:t>流</a:t>
             </a:r>
@@ -3718,12 +3780,18 @@
         </p:nvSpPr>
         <p:spPr>
           <a:xfrm>
-            <a:off x="3802380" y="4898995"/>
-            <a:ext cx="1165860" cy="634365"/>
+            <a:off x="3802379" y="4823370"/>
+            <a:ext cx="1284939" cy="634365"/>
           </a:xfrm>
           <a:prstGeom prst="roundRect">
             <a:avLst/>
           </a:prstGeom>
+          <a:noFill/>
+          <a:ln w="19050">
+            <a:solidFill>
+              <a:schemeClr val="tx1"/>
+            </a:solidFill>
+          </a:ln>
         </p:spPr>
         <p:style>
           <a:lnRef idx="2">
@@ -3751,8 +3819,10 @@
                 <a:solidFill>
                   <a:schemeClr val="tx1"/>
                 </a:solidFill>
+                <a:latin typeface="宋体" panose="02010600030101010101" pitchFamily="2" charset="-122"/>
+                <a:ea typeface="宋体" panose="02010600030101010101" pitchFamily="2" charset="-122"/>
               </a:rPr>
-              <a:t>异常</a:t>
+              <a:t>发现异常</a:t>
             </a:r>
           </a:p>
         </p:txBody>
@@ -3771,12 +3841,23 @@
         </p:nvSpPr>
         <p:spPr>
           <a:xfrm rot="20312237">
-            <a:off x="4986450" y="4977431"/>
-            <a:ext cx="589031" cy="211172"/>
+            <a:off x="5115451" y="4844020"/>
+            <a:ext cx="423438" cy="263601"/>
           </a:xfrm>
           <a:prstGeom prst="rightArrow">
             <a:avLst/>
           </a:prstGeom>
+          <a:solidFill>
+            <a:schemeClr val="accent5">
+              <a:lumMod val="60000"/>
+              <a:lumOff val="40000"/>
+            </a:schemeClr>
+          </a:solidFill>
+          <a:ln>
+            <a:solidFill>
+              <a:schemeClr val="tx1"/>
+            </a:solidFill>
+          </a:ln>
         </p:spPr>
         <p:style>
           <a:lnRef idx="2">
@@ -3799,7 +3880,10 @@
           <a:lstStyle/>
           <a:p>
             <a:pPr algn="ctr"/>
-            <a:endParaRPr lang="zh-CN" altLang="en-US"/>
+            <a:endParaRPr lang="zh-CN" altLang="en-US">
+              <a:latin typeface="宋体" panose="02010600030101010101" pitchFamily="2" charset="-122"/>
+              <a:ea typeface="宋体" panose="02010600030101010101" pitchFamily="2" charset="-122"/>
+            </a:endParaRPr>
           </a:p>
         </p:txBody>
       </p:sp>
@@ -3817,12 +3901,23 @@
         </p:nvSpPr>
         <p:spPr>
           <a:xfrm rot="1422997">
-            <a:off x="4987066" y="5345657"/>
-            <a:ext cx="589031" cy="211172"/>
+            <a:off x="5108315" y="5252968"/>
+            <a:ext cx="443122" cy="276757"/>
           </a:xfrm>
           <a:prstGeom prst="rightArrow">
             <a:avLst/>
           </a:prstGeom>
+          <a:solidFill>
+            <a:schemeClr val="accent5">
+              <a:lumMod val="60000"/>
+              <a:lumOff val="40000"/>
+            </a:schemeClr>
+          </a:solidFill>
+          <a:ln>
+            <a:solidFill>
+              <a:schemeClr val="tx1"/>
+            </a:solidFill>
+          </a:ln>
         </p:spPr>
         <p:style>
           <a:lnRef idx="2">
@@ -3845,7 +3940,10 @@
           <a:lstStyle/>
           <a:p>
             <a:pPr algn="ctr"/>
-            <a:endParaRPr lang="zh-CN" altLang="en-US"/>
+            <a:endParaRPr lang="zh-CN" altLang="en-US">
+              <a:latin typeface="宋体" panose="02010600030101010101" pitchFamily="2" charset="-122"/>
+              <a:ea typeface="宋体" panose="02010600030101010101" pitchFamily="2" charset="-122"/>
+            </a:endParaRPr>
           </a:p>
         </p:txBody>
       </p:sp>
@@ -3869,6 +3967,12 @@
           <a:prstGeom prst="roundRect">
             <a:avLst/>
           </a:prstGeom>
+          <a:noFill/>
+          <a:ln w="19050">
+            <a:solidFill>
+              <a:schemeClr val="tx1"/>
+            </a:solidFill>
+          </a:ln>
         </p:spPr>
         <p:style>
           <a:lnRef idx="2">
@@ -3896,6 +4000,8 @@
                 <a:solidFill>
                   <a:schemeClr val="tx1"/>
                 </a:solidFill>
+                <a:latin typeface="宋体" panose="02010600030101010101" pitchFamily="2" charset="-122"/>
+                <a:ea typeface="宋体" panose="02010600030101010101" pitchFamily="2" charset="-122"/>
               </a:rPr>
               <a:t>异常</a:t>
             </a:r>
@@ -3903,6 +4009,8 @@
               <a:solidFill>
                 <a:schemeClr val="tx1"/>
               </a:solidFill>
+              <a:latin typeface="宋体" panose="02010600030101010101" pitchFamily="2" charset="-122"/>
+              <a:ea typeface="宋体" panose="02010600030101010101" pitchFamily="2" charset="-122"/>
             </a:endParaRPr>
           </a:p>
           <a:p>
@@ -3912,6 +4020,8 @@
                 <a:solidFill>
                   <a:schemeClr val="tx1"/>
                 </a:solidFill>
+                <a:latin typeface="宋体" panose="02010600030101010101" pitchFamily="2" charset="-122"/>
+                <a:ea typeface="宋体" panose="02010600030101010101" pitchFamily="2" charset="-122"/>
               </a:rPr>
               <a:t>信息</a:t>
             </a:r>
@@ -3938,6 +4048,17 @@
           <a:prstGeom prst="rightArrow">
             <a:avLst/>
           </a:prstGeom>
+          <a:solidFill>
+            <a:schemeClr val="accent5">
+              <a:lumMod val="60000"/>
+              <a:lumOff val="40000"/>
+            </a:schemeClr>
+          </a:solidFill>
+          <a:ln>
+            <a:solidFill>
+              <a:schemeClr val="tx1"/>
+            </a:solidFill>
+          </a:ln>
         </p:spPr>
         <p:style>
           <a:lnRef idx="2">
@@ -3960,7 +4081,10 @@
           <a:lstStyle/>
           <a:p>
             <a:pPr algn="ctr"/>
-            <a:endParaRPr lang="zh-CN" altLang="en-US"/>
+            <a:endParaRPr lang="zh-CN" altLang="en-US">
+              <a:latin typeface="宋体" panose="02010600030101010101" pitchFamily="2" charset="-122"/>
+              <a:ea typeface="宋体" panose="02010600030101010101" pitchFamily="2" charset="-122"/>
+            </a:endParaRPr>
           </a:p>
         </p:txBody>
       </p:sp>
@@ -3988,6 +4112,17 @@
               <a:gd name="adj3" fmla="val 15814"/>
             </a:avLst>
           </a:prstGeom>
+          <a:solidFill>
+            <a:schemeClr val="accent5">
+              <a:lumMod val="60000"/>
+              <a:lumOff val="40000"/>
+            </a:schemeClr>
+          </a:solidFill>
+          <a:ln>
+            <a:solidFill>
+              <a:schemeClr val="tx1"/>
+            </a:solidFill>
+          </a:ln>
         </p:spPr>
         <p:style>
           <a:lnRef idx="2">
@@ -4010,7 +4145,10 @@
           <a:lstStyle/>
           <a:p>
             <a:pPr algn="ctr"/>
-            <a:endParaRPr lang="zh-CN" altLang="en-US"/>
+            <a:endParaRPr lang="zh-CN" altLang="en-US">
+              <a:latin typeface="宋体" panose="02010600030101010101" pitchFamily="2" charset="-122"/>
+              <a:ea typeface="宋体" panose="02010600030101010101" pitchFamily="2" charset="-122"/>
+            </a:endParaRPr>
           </a:p>
         </p:txBody>
       </p:sp>
@@ -4028,18 +4166,23 @@
         </p:nvSpPr>
         <p:spPr>
           <a:xfrm>
-            <a:off x="7579910" y="493632"/>
-            <a:ext cx="2049780" cy="1131684"/>
+            <a:off x="7544080" y="454103"/>
+            <a:ext cx="2032676" cy="1131684"/>
           </a:xfrm>
           <a:prstGeom prst="cloud">
             <a:avLst/>
           </a:prstGeom>
           <a:solidFill>
-            <a:schemeClr val="accent1">
+            <a:schemeClr val="accent5">
               <a:lumMod val="60000"/>
               <a:lumOff val="40000"/>
             </a:schemeClr>
           </a:solidFill>
+          <a:ln>
+            <a:solidFill>
+              <a:schemeClr val="tx1"/>
+            </a:solidFill>
+          </a:ln>
         </p:spPr>
         <p:style>
           <a:lnRef idx="2">
@@ -4063,8 +4206,14 @@
           <a:p>
             <a:pPr algn="ctr"/>
             <a:r>
-              <a:rPr lang="zh-CN" altLang="en-US" dirty="0"/>
-              <a:t>云服务器</a:t>
+              <a:rPr lang="zh-CN" altLang="en-US" dirty="0">
+                <a:solidFill>
+                  <a:schemeClr val="tx1"/>
+                </a:solidFill>
+                <a:latin typeface="宋体" panose="02010600030101010101" pitchFamily="2" charset="-122"/>
+                <a:ea typeface="宋体" panose="02010600030101010101" pitchFamily="2" charset="-122"/>
+              </a:rPr>
+              <a:t>文件和信息云服务器</a:t>
             </a:r>
           </a:p>
         </p:txBody>
@@ -4094,6 +4243,17 @@
               <a:gd name="adj4" fmla="val 1536"/>
             </a:avLst>
           </a:prstGeom>
+          <a:solidFill>
+            <a:schemeClr val="accent5">
+              <a:lumMod val="60000"/>
+              <a:lumOff val="40000"/>
+            </a:schemeClr>
+          </a:solidFill>
+          <a:ln>
+            <a:solidFill>
+              <a:schemeClr val="tx1"/>
+            </a:solidFill>
+          </a:ln>
         </p:spPr>
         <p:style>
           <a:lnRef idx="2">
@@ -4120,6 +4280,8 @@
               <a:solidFill>
                 <a:schemeClr val="tx1"/>
               </a:solidFill>
+              <a:latin typeface="宋体" panose="02010600030101010101" pitchFamily="2" charset="-122"/>
+              <a:ea typeface="宋体" panose="02010600030101010101" pitchFamily="2" charset="-122"/>
             </a:endParaRPr>
           </a:p>
         </p:txBody>
@@ -4144,6 +4306,17 @@
           <a:prstGeom prst="upDownArrow">
             <a:avLst/>
           </a:prstGeom>
+          <a:solidFill>
+            <a:schemeClr val="accent5">
+              <a:lumMod val="60000"/>
+              <a:lumOff val="40000"/>
+            </a:schemeClr>
+          </a:solidFill>
+          <a:ln>
+            <a:solidFill>
+              <a:schemeClr val="tx1"/>
+            </a:solidFill>
+          </a:ln>
         </p:spPr>
         <p:style>
           <a:lnRef idx="2">
@@ -4166,7 +4339,10 @@
           <a:lstStyle/>
           <a:p>
             <a:pPr algn="ctr"/>
-            <a:endParaRPr lang="zh-CN" altLang="en-US"/>
+            <a:endParaRPr lang="zh-CN" altLang="en-US">
+              <a:latin typeface="宋体" panose="02010600030101010101" pitchFamily="2" charset="-122"/>
+              <a:ea typeface="宋体" panose="02010600030101010101" pitchFamily="2" charset="-122"/>
+            </a:endParaRPr>
           </a:p>
         </p:txBody>
       </p:sp>
@@ -4199,10 +4375,16 @@
           <a:lstStyle/>
           <a:p>
             <a:r>
-              <a:rPr lang="zh-CN" altLang="en-US" dirty="0"/>
+              <a:rPr lang="zh-CN" altLang="en-US" dirty="0">
+                <a:latin typeface="宋体" panose="02010600030101010101" pitchFamily="2" charset="-122"/>
+                <a:ea typeface="宋体" panose="02010600030101010101" pitchFamily="2" charset="-122"/>
+              </a:rPr>
               <a:t>传输视频文件</a:t>
             </a:r>
-            <a:endParaRPr lang="en-US" altLang="zh-CN" dirty="0"/>
+            <a:endParaRPr lang="en-US" altLang="zh-CN" dirty="0">
+              <a:latin typeface="宋体" panose="02010600030101010101" pitchFamily="2" charset="-122"/>
+              <a:ea typeface="宋体" panose="02010600030101010101" pitchFamily="2" charset="-122"/>
+            </a:endParaRPr>
           </a:p>
         </p:txBody>
       </p:sp>
@@ -4235,10 +4417,16 @@
           <a:lstStyle/>
           <a:p>
             <a:r>
-              <a:rPr lang="zh-CN" altLang="en-US" dirty="0"/>
+              <a:rPr lang="zh-CN" altLang="en-US" dirty="0">
+                <a:latin typeface="宋体" panose="02010600030101010101" pitchFamily="2" charset="-122"/>
+                <a:ea typeface="宋体" panose="02010600030101010101" pitchFamily="2" charset="-122"/>
+              </a:rPr>
               <a:t>发送异常信息</a:t>
             </a:r>
-            <a:endParaRPr lang="en-US" altLang="zh-CN" dirty="0"/>
+            <a:endParaRPr lang="en-US" altLang="zh-CN" dirty="0">
+              <a:latin typeface="宋体" panose="02010600030101010101" pitchFamily="2" charset="-122"/>
+              <a:ea typeface="宋体" panose="02010600030101010101" pitchFamily="2" charset="-122"/>
+            </a:endParaRPr>
           </a:p>
         </p:txBody>
       </p:sp>
@@ -4271,10 +4459,16 @@
           <a:lstStyle/>
           <a:p>
             <a:r>
-              <a:rPr lang="zh-CN" altLang="en-US" dirty="0"/>
+              <a:rPr lang="zh-CN" altLang="en-US" dirty="0">
+                <a:latin typeface="宋体" panose="02010600030101010101" pitchFamily="2" charset="-122"/>
+                <a:ea typeface="宋体" panose="02010600030101010101" pitchFamily="2" charset="-122"/>
+              </a:rPr>
               <a:t>接收前端发来的命令</a:t>
             </a:r>
-            <a:endParaRPr lang="en-US" altLang="zh-CN" dirty="0"/>
+            <a:endParaRPr lang="en-US" altLang="zh-CN" dirty="0">
+              <a:latin typeface="宋体" panose="02010600030101010101" pitchFamily="2" charset="-122"/>
+              <a:ea typeface="宋体" panose="02010600030101010101" pitchFamily="2" charset="-122"/>
+            </a:endParaRPr>
           </a:p>
         </p:txBody>
       </p:sp>
@@ -4299,11 +4493,16 @@
             <a:avLst/>
           </a:prstGeom>
           <a:solidFill>
-            <a:schemeClr val="accent1">
+            <a:schemeClr val="accent5">
               <a:lumMod val="60000"/>
               <a:lumOff val="40000"/>
             </a:schemeClr>
           </a:solidFill>
+          <a:ln>
+            <a:solidFill>
+              <a:schemeClr val="tx1"/>
+            </a:solidFill>
+          </a:ln>
         </p:spPr>
         <p:style>
           <a:lnRef idx="2">
@@ -4327,7 +4526,13 @@
           <a:p>
             <a:pPr algn="ctr"/>
             <a:r>
-              <a:rPr lang="zh-CN" altLang="en-US" dirty="0"/>
+              <a:rPr lang="zh-CN" altLang="en-US" dirty="0">
+                <a:solidFill>
+                  <a:schemeClr val="tx1"/>
+                </a:solidFill>
+                <a:latin typeface="宋体" panose="02010600030101010101" pitchFamily="2" charset="-122"/>
+                <a:ea typeface="宋体" panose="02010600030101010101" pitchFamily="2" charset="-122"/>
+              </a:rPr>
               <a:t>流媒体云服务器</a:t>
             </a:r>
           </a:p>
@@ -4353,6 +4558,17 @@
           <a:prstGeom prst="rightArrow">
             <a:avLst/>
           </a:prstGeom>
+          <a:solidFill>
+            <a:schemeClr val="accent5">
+              <a:lumMod val="60000"/>
+              <a:lumOff val="40000"/>
+            </a:schemeClr>
+          </a:solidFill>
+          <a:ln>
+            <a:solidFill>
+              <a:schemeClr val="tx1"/>
+            </a:solidFill>
+          </a:ln>
         </p:spPr>
         <p:style>
           <a:lnRef idx="2">
@@ -4375,7 +4591,10 @@
           <a:lstStyle/>
           <a:p>
             <a:pPr algn="ctr"/>
-            <a:endParaRPr lang="zh-CN" altLang="en-US"/>
+            <a:endParaRPr lang="zh-CN" altLang="en-US">
+              <a:latin typeface="宋体" panose="02010600030101010101" pitchFamily="2" charset="-122"/>
+              <a:ea typeface="宋体" panose="02010600030101010101" pitchFamily="2" charset="-122"/>
+            </a:endParaRPr>
           </a:p>
         </p:txBody>
       </p:sp>
@@ -4408,14 +4627,24 @@
           <a:lstStyle/>
           <a:p>
             <a:r>
-              <a:rPr lang="en-US" altLang="zh-CN" dirty="0"/>
+              <a:rPr lang="en-US" altLang="zh-CN" dirty="0">
+                <a:latin typeface="Times New Roman" panose="02020603050405020304" pitchFamily="18" charset="0"/>
+                <a:ea typeface="宋体" panose="02010600030101010101" pitchFamily="2" charset="-122"/>
+                <a:cs typeface="Times New Roman" panose="02020603050405020304" pitchFamily="18" charset="0"/>
+              </a:rPr>
               <a:t>RTMP</a:t>
             </a:r>
             <a:r>
-              <a:rPr lang="zh-CN" altLang="en-US" dirty="0"/>
+              <a:rPr lang="zh-CN" altLang="en-US" dirty="0">
+                <a:latin typeface="宋体" panose="02010600030101010101" pitchFamily="2" charset="-122"/>
+                <a:ea typeface="宋体" panose="02010600030101010101" pitchFamily="2" charset="-122"/>
+              </a:rPr>
               <a:t>推流</a:t>
             </a:r>
-            <a:endParaRPr lang="en-US" altLang="zh-CN" dirty="0"/>
+            <a:endParaRPr lang="en-US" altLang="zh-CN" dirty="0">
+              <a:latin typeface="宋体" panose="02010600030101010101" pitchFamily="2" charset="-122"/>
+              <a:ea typeface="宋体" panose="02010600030101010101" pitchFamily="2" charset="-122"/>
+            </a:endParaRPr>
           </a:p>
         </p:txBody>
       </p:sp>
@@ -4435,7 +4664,7 @@
         </p:nvCxnSpPr>
         <p:spPr>
           <a:xfrm flipV="1">
-            <a:off x="2209800" y="4195099"/>
+            <a:off x="2199968" y="4802797"/>
             <a:ext cx="0" cy="681891"/>
           </a:xfrm>
           <a:prstGeom prst="straightConnector1">
@@ -4474,8 +4703,8 @@
         </p:nvSpPr>
         <p:spPr>
           <a:xfrm>
-            <a:off x="1612412" y="4648908"/>
-            <a:ext cx="759814" cy="307777"/>
+            <a:off x="1055369" y="5027106"/>
+            <a:ext cx="709474" cy="307777"/>
           </a:xfrm>
           <a:prstGeom prst="rect">
             <a:avLst/>
@@ -4488,12 +4717,19 @@
           </a:bodyPr>
           <a:lstStyle/>
           <a:p>
-            <a:r>
-              <a:rPr lang="zh-CN" altLang="en-US" sz="1400" dirty="0"/>
+            <a:pPr algn="ctr"/>
+            <a:r>
+              <a:rPr lang="zh-CN" altLang="en-US" sz="1400" b="1" dirty="0">
+                <a:latin typeface="宋体" panose="02010600030101010101" pitchFamily="2" charset="-122"/>
+                <a:ea typeface="宋体" panose="02010600030101010101" pitchFamily="2" charset="-122"/>
+              </a:rPr>
               <a:t>进程</a:t>
             </a:r>
             <a:r>
-              <a:rPr lang="en-US" altLang="zh-CN" sz="1400" dirty="0"/>
+              <a:rPr lang="en-US" altLang="zh-CN" sz="1400" b="1" dirty="0">
+                <a:latin typeface="宋体" panose="02010600030101010101" pitchFamily="2" charset="-122"/>
+                <a:ea typeface="宋体" panose="02010600030101010101" pitchFamily="2" charset="-122"/>
+              </a:rPr>
               <a:t>1</a:t>
             </a:r>
           </a:p>
@@ -4554,8 +4790,8 @@
         </p:nvSpPr>
         <p:spPr>
           <a:xfrm>
-            <a:off x="4673270" y="4458208"/>
-            <a:ext cx="759814" cy="307777"/>
+            <a:off x="4635929" y="4383882"/>
+            <a:ext cx="636438" cy="307777"/>
           </a:xfrm>
           <a:prstGeom prst="rect">
             <a:avLst/>
@@ -4568,12 +4804,19 @@
           </a:bodyPr>
           <a:lstStyle/>
           <a:p>
-            <a:r>
-              <a:rPr lang="zh-CN" altLang="en-US" sz="1400" dirty="0"/>
+            <a:pPr algn="ctr"/>
+            <a:r>
+              <a:rPr lang="zh-CN" altLang="en-US" sz="1400" b="1" dirty="0">
+                <a:latin typeface="宋体" panose="02010600030101010101" pitchFamily="2" charset="-122"/>
+                <a:ea typeface="宋体" panose="02010600030101010101" pitchFamily="2" charset="-122"/>
+              </a:rPr>
               <a:t>进程</a:t>
             </a:r>
             <a:r>
-              <a:rPr lang="en-US" altLang="zh-CN" sz="1400" dirty="0"/>
+              <a:rPr lang="en-US" altLang="zh-CN" sz="1400" b="1" dirty="0">
+                <a:latin typeface="宋体" panose="02010600030101010101" pitchFamily="2" charset="-122"/>
+                <a:ea typeface="宋体" panose="02010600030101010101" pitchFamily="2" charset="-122"/>
+              </a:rPr>
               <a:t>2</a:t>
             </a:r>
           </a:p>
@@ -4649,11 +4892,17 @@
           <a:lstStyle/>
           <a:p>
             <a:r>
-              <a:rPr lang="zh-CN" altLang="en-US" sz="1400" dirty="0"/>
+              <a:rPr lang="zh-CN" altLang="en-US" sz="1400" b="1" dirty="0">
+                <a:latin typeface="宋体" panose="02010600030101010101" pitchFamily="2" charset="-122"/>
+                <a:ea typeface="宋体" panose="02010600030101010101" pitchFamily="2" charset="-122"/>
+              </a:rPr>
               <a:t>进程</a:t>
             </a:r>
             <a:r>
-              <a:rPr lang="en-US" altLang="zh-CN" sz="1400" dirty="0"/>
+              <a:rPr lang="en-US" altLang="zh-CN" sz="1400" b="1" dirty="0">
+                <a:latin typeface="宋体" panose="02010600030101010101" pitchFamily="2" charset="-122"/>
+                <a:ea typeface="宋体" panose="02010600030101010101" pitchFamily="2" charset="-122"/>
+              </a:rPr>
               <a:t>3</a:t>
             </a:r>
           </a:p>
@@ -4673,12 +4922,26 @@
         </p:nvSpPr>
         <p:spPr>
           <a:xfrm>
-            <a:off x="131347" y="3844017"/>
-            <a:ext cx="1186506" cy="681891"/>
+            <a:off x="176162" y="3944778"/>
+            <a:ext cx="1352339" cy="480109"/>
           </a:xfrm>
           <a:prstGeom prst="rightArrow">
-            <a:avLst/>
-          </a:prstGeom>
+            <a:avLst>
+              <a:gd name="adj1" fmla="val 50000"/>
+              <a:gd name="adj2" fmla="val 61110"/>
+            </a:avLst>
+          </a:prstGeom>
+          <a:solidFill>
+            <a:schemeClr val="accent5">
+              <a:lumMod val="60000"/>
+              <a:lumOff val="40000"/>
+            </a:schemeClr>
+          </a:solidFill>
+          <a:ln>
+            <a:solidFill>
+              <a:schemeClr val="tx1"/>
+            </a:solidFill>
+          </a:ln>
         </p:spPr>
         <p:style>
           <a:lnRef idx="2">
@@ -4701,7 +4964,10 @@
           <a:lstStyle/>
           <a:p>
             <a:pPr algn="ctr"/>
-            <a:endParaRPr lang="zh-CN" altLang="en-US"/>
+            <a:endParaRPr lang="zh-CN" altLang="en-US">
+              <a:latin typeface="宋体" panose="02010600030101010101" pitchFamily="2" charset="-122"/>
+              <a:ea typeface="宋体" panose="02010600030101010101" pitchFamily="2" charset="-122"/>
+            </a:endParaRPr>
           </a:p>
         </p:txBody>
       </p:sp>
@@ -4719,8 +4985,8 @@
         </p:nvSpPr>
         <p:spPr>
           <a:xfrm>
-            <a:off x="99240" y="3635030"/>
-            <a:ext cx="777060" cy="369332"/>
+            <a:off x="107247" y="3702506"/>
+            <a:ext cx="692853" cy="369332"/>
           </a:xfrm>
           <a:prstGeom prst="rect">
             <a:avLst/>
@@ -4733,11 +4999,18 @@
           </a:bodyPr>
           <a:lstStyle/>
           <a:p>
-            <a:r>
-              <a:rPr lang="zh-CN" altLang="en-US" dirty="0"/>
+            <a:pPr algn="ctr"/>
+            <a:r>
+              <a:rPr lang="zh-CN" altLang="en-US" dirty="0">
+                <a:latin typeface="宋体" panose="02010600030101010101" pitchFamily="2" charset="-122"/>
+                <a:ea typeface="宋体" panose="02010600030101010101" pitchFamily="2" charset="-122"/>
+              </a:rPr>
               <a:t>执行</a:t>
             </a:r>
-            <a:endParaRPr lang="en-US" altLang="zh-CN" dirty="0"/>
+            <a:endParaRPr lang="en-US" altLang="zh-CN" dirty="0">
+              <a:latin typeface="宋体" panose="02010600030101010101" pitchFamily="2" charset="-122"/>
+              <a:ea typeface="宋体" panose="02010600030101010101" pitchFamily="2" charset="-122"/>
+            </a:endParaRPr>
           </a:p>
         </p:txBody>
       </p:sp>
@@ -4761,6 +5034,17 @@
           <a:prstGeom prst="downArrow">
             <a:avLst/>
           </a:prstGeom>
+          <a:solidFill>
+            <a:schemeClr val="accent5">
+              <a:lumMod val="60000"/>
+              <a:lumOff val="40000"/>
+            </a:schemeClr>
+          </a:solidFill>
+          <a:ln>
+            <a:solidFill>
+              <a:schemeClr val="tx1"/>
+            </a:solidFill>
+          </a:ln>
         </p:spPr>
         <p:style>
           <a:lnRef idx="2">
@@ -4783,7 +5067,10 @@
           <a:lstStyle/>
           <a:p>
             <a:pPr algn="ctr"/>
-            <a:endParaRPr lang="zh-CN" altLang="en-US"/>
+            <a:endParaRPr lang="zh-CN" altLang="en-US">
+              <a:latin typeface="宋体" panose="02010600030101010101" pitchFamily="2" charset="-122"/>
+              <a:ea typeface="宋体" panose="02010600030101010101" pitchFamily="2" charset="-122"/>
+            </a:endParaRPr>
           </a:p>
         </p:txBody>
       </p:sp>
@@ -4816,10 +5103,16 @@
           <a:lstStyle/>
           <a:p>
             <a:r>
-              <a:rPr lang="zh-CN" altLang="en-US" dirty="0"/>
+              <a:rPr lang="zh-CN" altLang="en-US" dirty="0">
+                <a:latin typeface="宋体" panose="02010600030101010101" pitchFamily="2" charset="-122"/>
+                <a:ea typeface="宋体" panose="02010600030101010101" pitchFamily="2" charset="-122"/>
+              </a:rPr>
               <a:t>转发流</a:t>
             </a:r>
-            <a:endParaRPr lang="en-US" altLang="zh-CN" dirty="0"/>
+            <a:endParaRPr lang="en-US" altLang="zh-CN" dirty="0">
+              <a:latin typeface="宋体" panose="02010600030101010101" pitchFamily="2" charset="-122"/>
+              <a:ea typeface="宋体" panose="02010600030101010101" pitchFamily="2" charset="-122"/>
+            </a:endParaRPr>
           </a:p>
         </p:txBody>
       </p:sp>
@@ -4843,6 +5136,17 @@
           <a:prstGeom prst="upDownArrow">
             <a:avLst/>
           </a:prstGeom>
+          <a:solidFill>
+            <a:schemeClr val="accent5">
+              <a:lumMod val="60000"/>
+              <a:lumOff val="40000"/>
+            </a:schemeClr>
+          </a:solidFill>
+          <a:ln>
+            <a:solidFill>
+              <a:schemeClr val="tx1"/>
+            </a:solidFill>
+          </a:ln>
         </p:spPr>
         <p:style>
           <a:lnRef idx="2">
@@ -4865,7 +5169,10 @@
           <a:lstStyle/>
           <a:p>
             <a:pPr algn="ctr"/>
-            <a:endParaRPr lang="zh-CN" altLang="en-US"/>
+            <a:endParaRPr lang="zh-CN" altLang="en-US">
+              <a:latin typeface="宋体" panose="02010600030101010101" pitchFamily="2" charset="-122"/>
+              <a:ea typeface="宋体" panose="02010600030101010101" pitchFamily="2" charset="-122"/>
+            </a:endParaRPr>
           </a:p>
         </p:txBody>
       </p:sp>
@@ -4898,17 +5205,23 @@
           <a:lstStyle/>
           <a:p>
             <a:r>
-              <a:rPr lang="zh-CN" altLang="en-US" dirty="0"/>
+              <a:rPr lang="zh-CN" altLang="en-US" dirty="0">
+                <a:latin typeface="宋体" panose="02010600030101010101" pitchFamily="2" charset="-122"/>
+                <a:ea typeface="宋体" panose="02010600030101010101" pitchFamily="2" charset="-122"/>
+              </a:rPr>
               <a:t>数据传输交互</a:t>
             </a:r>
-            <a:endParaRPr lang="en-US" altLang="zh-CN" dirty="0"/>
+            <a:endParaRPr lang="en-US" altLang="zh-CN" dirty="0">
+              <a:latin typeface="宋体" panose="02010600030101010101" pitchFamily="2" charset="-122"/>
+              <a:ea typeface="宋体" panose="02010600030101010101" pitchFamily="2" charset="-122"/>
+            </a:endParaRPr>
           </a:p>
         </p:txBody>
       </p:sp>
     </p:spTree>
     <p:extLst>
       <p:ext uri="{BB962C8B-B14F-4D97-AF65-F5344CB8AC3E}">
-        <p14:creationId xmlns:p14="http://schemas.microsoft.com/office/powerpoint/2010/main" val="3329571617"/>
+        <p14:creationId xmlns:p14="http://schemas.microsoft.com/office/powerpoint/2010/main" val="2245328537"/>
       </p:ext>
     </p:extLst>
   </p:cSld>
@@ -4955,6 +5268,12 @@
           <a:prstGeom prst="roundRect">
             <a:avLst/>
           </a:prstGeom>
+          <a:noFill/>
+          <a:ln w="19050">
+            <a:solidFill>
+              <a:schemeClr val="tx1"/>
+            </a:solidFill>
+          </a:ln>
         </p:spPr>
         <p:style>
           <a:lnRef idx="2">
@@ -4982,6 +5301,8 @@
                 <a:solidFill>
                   <a:schemeClr val="tx1"/>
                 </a:solidFill>
+                <a:latin typeface="宋体" panose="02010600030101010101" pitchFamily="2" charset="-122"/>
+                <a:ea typeface="宋体" panose="02010600030101010101" pitchFamily="2" charset="-122"/>
               </a:rPr>
               <a:t>摄像头</a:t>
             </a:r>
@@ -4990,6 +5311,8 @@
                 <a:solidFill>
                   <a:schemeClr val="tx1"/>
                 </a:solidFill>
+                <a:latin typeface="宋体" panose="02010600030101010101" pitchFamily="2" charset="-122"/>
+                <a:ea typeface="宋体" panose="02010600030101010101" pitchFamily="2" charset="-122"/>
               </a:rPr>
               <a:t>IMX477</a:t>
             </a:r>
@@ -4997,6 +5320,8 @@
               <a:solidFill>
                 <a:schemeClr val="tx1"/>
               </a:solidFill>
+              <a:latin typeface="宋体" panose="02010600030101010101" pitchFamily="2" charset="-122"/>
+              <a:ea typeface="宋体" panose="02010600030101010101" pitchFamily="2" charset="-122"/>
             </a:endParaRPr>
           </a:p>
         </p:txBody>
@@ -5021,6 +5346,12 @@
           <a:prstGeom prst="roundRect">
             <a:avLst/>
           </a:prstGeom>
+          <a:noFill/>
+          <a:ln w="19050">
+            <a:solidFill>
+              <a:schemeClr val="tx1"/>
+            </a:solidFill>
+          </a:ln>
         </p:spPr>
         <p:style>
           <a:lnRef idx="2">
@@ -5048,6 +5379,8 @@
                 <a:solidFill>
                   <a:schemeClr val="tx1"/>
                 </a:solidFill>
+                <a:latin typeface="宋体" panose="02010600030101010101" pitchFamily="2" charset="-122"/>
+                <a:ea typeface="宋体" panose="02010600030101010101" pitchFamily="2" charset="-122"/>
               </a:rPr>
               <a:t>视频帧预处理</a:t>
             </a:r>
@@ -5075,8 +5408,16 @@
             <a:avLst/>
           </a:prstGeom>
           <a:solidFill>
-            <a:schemeClr val="accent1"/>
+            <a:schemeClr val="accent5">
+              <a:lumMod val="40000"/>
+              <a:lumOff val="60000"/>
+            </a:schemeClr>
           </a:solidFill>
+          <a:ln>
+            <a:solidFill>
+              <a:schemeClr val="tx1"/>
+            </a:solidFill>
+          </a:ln>
         </p:spPr>
         <p:style>
           <a:lnRef idx="2">
@@ -5099,7 +5440,10 @@
           <a:lstStyle/>
           <a:p>
             <a:pPr algn="ctr"/>
-            <a:endParaRPr lang="zh-CN" altLang="en-US"/>
+            <a:endParaRPr lang="zh-CN" altLang="en-US">
+              <a:latin typeface="宋体" panose="02010600030101010101" pitchFamily="2" charset="-122"/>
+              <a:ea typeface="宋体" panose="02010600030101010101" pitchFamily="2" charset="-122"/>
+            </a:endParaRPr>
           </a:p>
         </p:txBody>
       </p:sp>
@@ -5123,6 +5467,12 @@
           <a:prstGeom prst="roundRect">
             <a:avLst/>
           </a:prstGeom>
+          <a:noFill/>
+          <a:ln w="19050">
+            <a:solidFill>
+              <a:schemeClr val="tx1"/>
+            </a:solidFill>
+          </a:ln>
         </p:spPr>
         <p:style>
           <a:lnRef idx="2">
@@ -5150,6 +5500,9 @@
                 <a:solidFill>
                   <a:schemeClr val="tx1"/>
                 </a:solidFill>
+                <a:latin typeface="Times New Roman" panose="02020603050405020304" pitchFamily="18" charset="0"/>
+                <a:ea typeface="宋体" panose="02010600030101010101" pitchFamily="2" charset="-122"/>
+                <a:cs typeface="Times New Roman" panose="02020603050405020304" pitchFamily="18" charset="0"/>
               </a:rPr>
               <a:t>Yolov3</a:t>
             </a:r>
@@ -5158,6 +5511,8 @@
                 <a:solidFill>
                   <a:schemeClr val="tx1"/>
                 </a:solidFill>
+                <a:latin typeface="宋体" panose="02010600030101010101" pitchFamily="2" charset="-122"/>
+                <a:ea typeface="宋体" panose="02010600030101010101" pitchFamily="2" charset="-122"/>
               </a:rPr>
               <a:t>模型推理</a:t>
             </a:r>
@@ -5184,6 +5539,17 @@
           <a:prstGeom prst="rightArrow">
             <a:avLst/>
           </a:prstGeom>
+          <a:solidFill>
+            <a:schemeClr val="accent5">
+              <a:lumMod val="40000"/>
+              <a:lumOff val="60000"/>
+            </a:schemeClr>
+          </a:solidFill>
+          <a:ln>
+            <a:solidFill>
+              <a:schemeClr val="tx1"/>
+            </a:solidFill>
+          </a:ln>
         </p:spPr>
         <p:style>
           <a:lnRef idx="2">
@@ -5206,7 +5572,10 @@
           <a:lstStyle/>
           <a:p>
             <a:pPr algn="ctr"/>
-            <a:endParaRPr lang="zh-CN" altLang="en-US"/>
+            <a:endParaRPr lang="zh-CN" altLang="en-US">
+              <a:latin typeface="宋体" panose="02010600030101010101" pitchFamily="2" charset="-122"/>
+              <a:ea typeface="宋体" panose="02010600030101010101" pitchFamily="2" charset="-122"/>
+            </a:endParaRPr>
           </a:p>
         </p:txBody>
       </p:sp>
@@ -5230,6 +5599,12 @@
           <a:prstGeom prst="roundRect">
             <a:avLst/>
           </a:prstGeom>
+          <a:noFill/>
+          <a:ln w="19050">
+            <a:solidFill>
+              <a:schemeClr val="tx1"/>
+            </a:solidFill>
+          </a:ln>
         </p:spPr>
         <p:style>
           <a:lnRef idx="2">
@@ -5257,6 +5632,8 @@
                 <a:solidFill>
                   <a:schemeClr val="tx1"/>
                 </a:solidFill>
+                <a:latin typeface="宋体" panose="02010600030101010101" pitchFamily="2" charset="-122"/>
+                <a:ea typeface="宋体" panose="02010600030101010101" pitchFamily="2" charset="-122"/>
               </a:rPr>
               <a:t>NVOSD</a:t>
             </a:r>
@@ -5265,6 +5642,8 @@
                 <a:solidFill>
                   <a:schemeClr val="tx1"/>
                 </a:solidFill>
+                <a:latin typeface="宋体" panose="02010600030101010101" pitchFamily="2" charset="-122"/>
+                <a:ea typeface="宋体" panose="02010600030101010101" pitchFamily="2" charset="-122"/>
               </a:rPr>
               <a:t>视频帧渲染</a:t>
             </a:r>
@@ -5291,6 +5670,17 @@
           <a:prstGeom prst="rightArrow">
             <a:avLst/>
           </a:prstGeom>
+          <a:solidFill>
+            <a:schemeClr val="accent5">
+              <a:lumMod val="40000"/>
+              <a:lumOff val="60000"/>
+            </a:schemeClr>
+          </a:solidFill>
+          <a:ln>
+            <a:solidFill>
+              <a:schemeClr val="tx1"/>
+            </a:solidFill>
+          </a:ln>
         </p:spPr>
         <p:style>
           <a:lnRef idx="2">
@@ -5313,7 +5703,10 @@
           <a:lstStyle/>
           <a:p>
             <a:pPr algn="ctr"/>
-            <a:endParaRPr lang="zh-CN" altLang="en-US"/>
+            <a:endParaRPr lang="zh-CN" altLang="en-US">
+              <a:latin typeface="宋体" panose="02010600030101010101" pitchFamily="2" charset="-122"/>
+              <a:ea typeface="宋体" panose="02010600030101010101" pitchFamily="2" charset="-122"/>
+            </a:endParaRPr>
           </a:p>
         </p:txBody>
       </p:sp>
@@ -5337,6 +5730,12 @@
           <a:prstGeom prst="roundRect">
             <a:avLst/>
           </a:prstGeom>
+          <a:noFill/>
+          <a:ln w="19050">
+            <a:solidFill>
+              <a:schemeClr val="tx1"/>
+            </a:solidFill>
+          </a:ln>
         </p:spPr>
         <p:style>
           <a:lnRef idx="2">
@@ -5364,6 +5763,8 @@
                 <a:solidFill>
                   <a:schemeClr val="tx1"/>
                 </a:solidFill>
+                <a:latin typeface="宋体" panose="02010600030101010101" pitchFamily="2" charset="-122"/>
+                <a:ea typeface="宋体" panose="02010600030101010101" pitchFamily="2" charset="-122"/>
               </a:rPr>
               <a:t>视频编码</a:t>
             </a:r>
@@ -5390,6 +5791,17 @@
           <a:prstGeom prst="rightArrow">
             <a:avLst/>
           </a:prstGeom>
+          <a:solidFill>
+            <a:schemeClr val="accent5">
+              <a:lumMod val="40000"/>
+              <a:lumOff val="60000"/>
+            </a:schemeClr>
+          </a:solidFill>
+          <a:ln>
+            <a:solidFill>
+              <a:schemeClr val="tx1"/>
+            </a:solidFill>
+          </a:ln>
         </p:spPr>
         <p:style>
           <a:lnRef idx="2">
@@ -5412,7 +5824,10 @@
           <a:lstStyle/>
           <a:p>
             <a:pPr algn="ctr"/>
-            <a:endParaRPr lang="zh-CN" altLang="en-US"/>
+            <a:endParaRPr lang="zh-CN" altLang="en-US">
+              <a:latin typeface="宋体" panose="02010600030101010101" pitchFamily="2" charset="-122"/>
+              <a:ea typeface="宋体" panose="02010600030101010101" pitchFamily="2" charset="-122"/>
+            </a:endParaRPr>
           </a:p>
         </p:txBody>
       </p:sp>
@@ -5436,6 +5851,12 @@
           <a:prstGeom prst="roundRect">
             <a:avLst/>
           </a:prstGeom>
+          <a:noFill/>
+          <a:ln w="19050">
+            <a:solidFill>
+              <a:schemeClr val="tx1"/>
+            </a:solidFill>
+          </a:ln>
         </p:spPr>
         <p:style>
           <a:lnRef idx="2">
@@ -5463,6 +5884,8 @@
                 <a:solidFill>
                   <a:schemeClr val="tx1"/>
                 </a:solidFill>
+                <a:latin typeface="宋体" panose="02010600030101010101" pitchFamily="2" charset="-122"/>
+                <a:ea typeface="宋体" panose="02010600030101010101" pitchFamily="2" charset="-122"/>
               </a:rPr>
               <a:t>RTMP</a:t>
             </a:r>
@@ -5471,6 +5894,8 @@
                 <a:solidFill>
                   <a:schemeClr val="tx1"/>
                 </a:solidFill>
+                <a:latin typeface="宋体" panose="02010600030101010101" pitchFamily="2" charset="-122"/>
+                <a:ea typeface="宋体" panose="02010600030101010101" pitchFamily="2" charset="-122"/>
               </a:rPr>
               <a:t>推流</a:t>
             </a:r>
@@ -5497,6 +5922,17 @@
           <a:prstGeom prst="rightArrow">
             <a:avLst/>
           </a:prstGeom>
+          <a:solidFill>
+            <a:schemeClr val="accent5">
+              <a:lumMod val="40000"/>
+              <a:lumOff val="60000"/>
+            </a:schemeClr>
+          </a:solidFill>
+          <a:ln>
+            <a:solidFill>
+              <a:schemeClr val="tx1"/>
+            </a:solidFill>
+          </a:ln>
         </p:spPr>
         <p:style>
           <a:lnRef idx="2">
@@ -5519,7 +5955,10 @@
           <a:lstStyle/>
           <a:p>
             <a:pPr algn="ctr"/>
-            <a:endParaRPr lang="zh-CN" altLang="en-US"/>
+            <a:endParaRPr lang="zh-CN" altLang="en-US">
+              <a:latin typeface="宋体" panose="02010600030101010101" pitchFamily="2" charset="-122"/>
+              <a:ea typeface="宋体" panose="02010600030101010101" pitchFamily="2" charset="-122"/>
+            </a:endParaRPr>
           </a:p>
         </p:txBody>
       </p:sp>
@@ -5543,6 +5982,17 @@
           <a:prstGeom prst="downArrow">
             <a:avLst/>
           </a:prstGeom>
+          <a:solidFill>
+            <a:schemeClr val="accent5">
+              <a:lumMod val="40000"/>
+              <a:lumOff val="60000"/>
+            </a:schemeClr>
+          </a:solidFill>
+          <a:ln>
+            <a:solidFill>
+              <a:schemeClr val="tx1"/>
+            </a:solidFill>
+          </a:ln>
         </p:spPr>
         <p:style>
           <a:lnRef idx="2">
@@ -5565,7 +6015,10 @@
           <a:lstStyle/>
           <a:p>
             <a:pPr algn="ctr"/>
-            <a:endParaRPr lang="zh-CN" altLang="en-US"/>
+            <a:endParaRPr lang="zh-CN" altLang="en-US">
+              <a:latin typeface="宋体" panose="02010600030101010101" pitchFamily="2" charset="-122"/>
+              <a:ea typeface="宋体" panose="02010600030101010101" pitchFamily="2" charset="-122"/>
+            </a:endParaRPr>
           </a:p>
         </p:txBody>
       </p:sp>
@@ -5589,6 +6042,12 @@
           <a:prstGeom prst="roundRect">
             <a:avLst/>
           </a:prstGeom>
+          <a:noFill/>
+          <a:ln w="19050">
+            <a:solidFill>
+              <a:schemeClr val="tx1"/>
+            </a:solidFill>
+          </a:ln>
         </p:spPr>
         <p:style>
           <a:lnRef idx="2">
@@ -5616,6 +6075,8 @@
                 <a:solidFill>
                   <a:schemeClr val="tx1"/>
                 </a:solidFill>
+                <a:latin typeface="宋体" panose="02010600030101010101" pitchFamily="2" charset="-122"/>
+                <a:ea typeface="宋体" panose="02010600030101010101" pitchFamily="2" charset="-122"/>
               </a:rPr>
               <a:t>输出检测信息</a:t>
             </a:r>
@@ -5636,13 +6097,18 @@
         </p:nvSpPr>
         <p:spPr>
           <a:xfrm>
-            <a:off x="419100" y="1181100"/>
-            <a:ext cx="10888980" cy="3314700"/>
+            <a:off x="419100" y="1369743"/>
+            <a:ext cx="10934700" cy="3126057"/>
           </a:xfrm>
           <a:prstGeom prst="roundRect">
             <a:avLst/>
           </a:prstGeom>
           <a:noFill/>
+          <a:ln w="28575">
+            <a:solidFill>
+              <a:schemeClr val="tx1"/>
+            </a:solidFill>
+          </a:ln>
         </p:spPr>
         <p:style>
           <a:lnRef idx="2">
@@ -5665,7 +6131,10 @@
           <a:lstStyle/>
           <a:p>
             <a:pPr algn="ctr"/>
-            <a:endParaRPr lang="zh-CN" altLang="en-US"/>
+            <a:endParaRPr lang="zh-CN" altLang="en-US">
+              <a:latin typeface="宋体" panose="02010600030101010101" pitchFamily="2" charset="-122"/>
+              <a:ea typeface="宋体" panose="02010600030101010101" pitchFamily="2" charset="-122"/>
+            </a:endParaRPr>
           </a:p>
         </p:txBody>
       </p:sp>
@@ -5689,6 +6158,17 @@
           <a:prstGeom prst="downArrow">
             <a:avLst/>
           </a:prstGeom>
+          <a:solidFill>
+            <a:schemeClr val="accent5">
+              <a:lumMod val="40000"/>
+              <a:lumOff val="60000"/>
+            </a:schemeClr>
+          </a:solidFill>
+          <a:ln>
+            <a:solidFill>
+              <a:schemeClr val="tx1"/>
+            </a:solidFill>
+          </a:ln>
         </p:spPr>
         <p:style>
           <a:lnRef idx="2">
@@ -5711,7 +6191,10 @@
           <a:lstStyle/>
           <a:p>
             <a:pPr algn="ctr"/>
-            <a:endParaRPr lang="zh-CN" altLang="en-US"/>
+            <a:endParaRPr lang="zh-CN" altLang="en-US">
+              <a:latin typeface="宋体" panose="02010600030101010101" pitchFamily="2" charset="-122"/>
+              <a:ea typeface="宋体" panose="02010600030101010101" pitchFamily="2" charset="-122"/>
+            </a:endParaRPr>
           </a:p>
         </p:txBody>
       </p:sp>
@@ -5729,8 +6212,8 @@
         </p:nvSpPr>
         <p:spPr>
           <a:xfrm>
-            <a:off x="8328660" y="3733800"/>
-            <a:ext cx="2575560" cy="369332"/>
+            <a:off x="4907280" y="1418416"/>
+            <a:ext cx="1958340" cy="369332"/>
           </a:xfrm>
           <a:prstGeom prst="rect">
             <a:avLst/>
@@ -5744,11 +6227,18 @@
           <a:lstStyle/>
           <a:p>
             <a:r>
-              <a:rPr lang="en-US" altLang="zh-CN" b="1" dirty="0"/>
-              <a:t>Deep Stream</a:t>
-            </a:r>
-            <a:r>
-              <a:rPr lang="zh-CN" altLang="en-US" b="1" dirty="0"/>
+              <a:rPr lang="en-US" altLang="zh-CN" b="1" dirty="0">
+                <a:latin typeface="Times New Roman" panose="02020603050405020304" pitchFamily="18" charset="0"/>
+                <a:ea typeface="宋体" panose="02010600030101010101" pitchFamily="2" charset="-122"/>
+                <a:cs typeface="Times New Roman" panose="02020603050405020304" pitchFamily="18" charset="0"/>
+              </a:rPr>
+              <a:t>DeepStream</a:t>
+            </a:r>
+            <a:r>
+              <a:rPr lang="zh-CN" altLang="en-US" b="1" dirty="0">
+                <a:latin typeface="宋体" panose="02010600030101010101" pitchFamily="2" charset="-122"/>
+                <a:ea typeface="宋体" panose="02010600030101010101" pitchFamily="2" charset="-122"/>
+              </a:rPr>
               <a:t>管道</a:t>
             </a:r>
           </a:p>
@@ -5774,6 +6264,12 @@
           <a:prstGeom prst="roundRect">
             <a:avLst/>
           </a:prstGeom>
+          <a:noFill/>
+          <a:ln w="19050">
+            <a:solidFill>
+              <a:schemeClr val="tx1"/>
+            </a:solidFill>
+          </a:ln>
         </p:spPr>
         <p:style>
           <a:lnRef idx="2">
@@ -5801,6 +6297,8 @@
                 <a:solidFill>
                   <a:schemeClr val="tx1"/>
                 </a:solidFill>
+                <a:latin typeface="宋体" panose="02010600030101010101" pitchFamily="2" charset="-122"/>
+                <a:ea typeface="宋体" panose="02010600030101010101" pitchFamily="2" charset="-122"/>
               </a:rPr>
               <a:t>MQTT</a:t>
             </a:r>
@@ -5809,6 +6307,8 @@
                 <a:solidFill>
                   <a:schemeClr val="tx1"/>
                 </a:solidFill>
+                <a:latin typeface="宋体" panose="02010600030101010101" pitchFamily="2" charset="-122"/>
+                <a:ea typeface="宋体" panose="02010600030101010101" pitchFamily="2" charset="-122"/>
               </a:rPr>
               <a:t>协议传输</a:t>
             </a:r>
@@ -5835,6 +6335,17 @@
           <a:prstGeom prst="rightArrow">
             <a:avLst/>
           </a:prstGeom>
+          <a:solidFill>
+            <a:schemeClr val="accent5">
+              <a:lumMod val="40000"/>
+              <a:lumOff val="60000"/>
+            </a:schemeClr>
+          </a:solidFill>
+          <a:ln>
+            <a:solidFill>
+              <a:schemeClr val="tx1"/>
+            </a:solidFill>
+          </a:ln>
         </p:spPr>
         <p:style>
           <a:lnRef idx="2">
@@ -5857,7 +6368,10 @@
           <a:lstStyle/>
           <a:p>
             <a:pPr algn="ctr"/>
-            <a:endParaRPr lang="zh-CN" altLang="en-US"/>
+            <a:endParaRPr lang="zh-CN" altLang="en-US">
+              <a:latin typeface="宋体" panose="02010600030101010101" pitchFamily="2" charset="-122"/>
+              <a:ea typeface="宋体" panose="02010600030101010101" pitchFamily="2" charset="-122"/>
+            </a:endParaRPr>
           </a:p>
         </p:txBody>
       </p:sp>
@@ -5881,6 +6395,17 @@
           <a:prstGeom prst="cloud">
             <a:avLst/>
           </a:prstGeom>
+          <a:solidFill>
+            <a:schemeClr val="accent5">
+              <a:lumMod val="60000"/>
+              <a:lumOff val="40000"/>
+            </a:schemeClr>
+          </a:solidFill>
+          <a:ln w="19050">
+            <a:solidFill>
+              <a:schemeClr val="tx1"/>
+            </a:solidFill>
+          </a:ln>
         </p:spPr>
         <p:style>
           <a:lnRef idx="1">
@@ -5902,7 +6427,10 @@
           <a:p>
             <a:pPr algn="ctr"/>
             <a:r>
-              <a:rPr lang="zh-CN" altLang="en-US" dirty="0"/>
+              <a:rPr lang="zh-CN" altLang="en-US" dirty="0">
+                <a:latin typeface="宋体" panose="02010600030101010101" pitchFamily="2" charset="-122"/>
+                <a:ea typeface="宋体" panose="02010600030101010101" pitchFamily="2" charset="-122"/>
+              </a:rPr>
               <a:t>云服务器</a:t>
             </a:r>
           </a:p>
@@ -5928,6 +6456,12 @@
           <a:prstGeom prst="roundRect">
             <a:avLst/>
           </a:prstGeom>
+          <a:noFill/>
+          <a:ln w="19050">
+            <a:solidFill>
+              <a:schemeClr val="tx1"/>
+            </a:solidFill>
+          </a:ln>
         </p:spPr>
         <p:style>
           <a:lnRef idx="2">
@@ -5955,6 +6489,8 @@
                 <a:solidFill>
                   <a:schemeClr val="tx1"/>
                 </a:solidFill>
+                <a:latin typeface="宋体" panose="02010600030101010101" pitchFamily="2" charset="-122"/>
+                <a:ea typeface="宋体" panose="02010600030101010101" pitchFamily="2" charset="-122"/>
               </a:rPr>
               <a:t>前端交互界面</a:t>
             </a:r>
@@ -5981,6 +6517,17 @@
           <a:prstGeom prst="upDownArrow">
             <a:avLst/>
           </a:prstGeom>
+          <a:solidFill>
+            <a:schemeClr val="accent5">
+              <a:lumMod val="40000"/>
+              <a:lumOff val="60000"/>
+            </a:schemeClr>
+          </a:solidFill>
+          <a:ln>
+            <a:solidFill>
+              <a:schemeClr val="tx1"/>
+            </a:solidFill>
+          </a:ln>
         </p:spPr>
         <p:style>
           <a:lnRef idx="2">
@@ -6003,48 +6550,9 @@
           <a:lstStyle/>
           <a:p>
             <a:pPr algn="ctr"/>
-            <a:endParaRPr lang="zh-CN" altLang="en-US"/>
-          </a:p>
-        </p:txBody>
-      </p:sp>
-      <p:sp>
-        <p:nvSpPr>
-          <p:cNvPr id="29" name="文本框 28">
-            <a:extLst>
-              <a:ext uri="{FF2B5EF4-FFF2-40B4-BE49-F238E27FC236}">
-                <a16:creationId xmlns:a16="http://schemas.microsoft.com/office/drawing/2014/main" id="{ACB69324-7CCE-4FCF-91DA-AA2660338F4A}"/>
-              </a:ext>
-            </a:extLst>
-          </p:cNvPr>
-          <p:cNvSpPr txBox="1"/>
-          <p:nvPr/>
-        </p:nvSpPr>
-        <p:spPr>
-          <a:xfrm>
-            <a:off x="4831080" y="239740"/>
-            <a:ext cx="2278380" cy="523220"/>
-          </a:xfrm>
-          <a:prstGeom prst="rect">
-            <a:avLst/>
-          </a:prstGeom>
-          <a:noFill/>
-        </p:spPr>
-        <p:txBody>
-          <a:bodyPr wrap="square" rtlCol="0">
-            <a:spAutoFit/>
-          </a:bodyPr>
-          <a:lstStyle/>
-          <a:p>
-            <a:r>
-              <a:rPr lang="en-US" altLang="zh-CN" sz="2800" b="1" dirty="0">
-                <a:latin typeface="Times New Roman" panose="02020603050405020304" pitchFamily="18" charset="0"/>
-                <a:cs typeface="Times New Roman" panose="02020603050405020304" pitchFamily="18" charset="0"/>
-              </a:rPr>
-              <a:t>DeepStream</a:t>
-            </a:r>
-            <a:endParaRPr lang="zh-CN" altLang="en-US" sz="2800" b="1" dirty="0">
-              <a:latin typeface="Times New Roman" panose="02020603050405020304" pitchFamily="18" charset="0"/>
-              <a:cs typeface="Times New Roman" panose="02020603050405020304" pitchFamily="18" charset="0"/>
+            <a:endParaRPr lang="zh-CN" altLang="en-US">
+              <a:latin typeface="宋体" panose="02010600030101010101" pitchFamily="2" charset="-122"/>
+              <a:ea typeface="宋体" panose="02010600030101010101" pitchFamily="2" charset="-122"/>
             </a:endParaRPr>
           </a:p>
         </p:txBody>
@@ -6069,6 +6577,17 @@
           <a:prstGeom prst="bentUpArrow">
             <a:avLst/>
           </a:prstGeom>
+          <a:solidFill>
+            <a:schemeClr val="accent5">
+              <a:lumMod val="40000"/>
+              <a:lumOff val="60000"/>
+            </a:schemeClr>
+          </a:solidFill>
+          <a:ln>
+            <a:solidFill>
+              <a:schemeClr val="tx1"/>
+            </a:solidFill>
+          </a:ln>
         </p:spPr>
         <p:style>
           <a:lnRef idx="2">
@@ -6091,7 +6610,10 @@
           <a:lstStyle/>
           <a:p>
             <a:pPr algn="ctr"/>
-            <a:endParaRPr lang="zh-CN" altLang="en-US"/>
+            <a:endParaRPr lang="zh-CN" altLang="en-US">
+              <a:latin typeface="宋体" panose="02010600030101010101" pitchFamily="2" charset="-122"/>
+              <a:ea typeface="宋体" panose="02010600030101010101" pitchFamily="2" charset="-122"/>
+            </a:endParaRPr>
           </a:p>
         </p:txBody>
       </p:sp>
@@ -6115,6 +6637,12 @@
           <a:prstGeom prst="roundRect">
             <a:avLst/>
           </a:prstGeom>
+          <a:noFill/>
+          <a:ln w="19050">
+            <a:solidFill>
+              <a:schemeClr val="tx1"/>
+            </a:solidFill>
+          </a:ln>
         </p:spPr>
         <p:style>
           <a:lnRef idx="2">
@@ -6142,6 +6670,8 @@
                 <a:solidFill>
                   <a:schemeClr val="tx1"/>
                 </a:solidFill>
+                <a:latin typeface="宋体" panose="02010600030101010101" pitchFamily="2" charset="-122"/>
+                <a:ea typeface="宋体" panose="02010600030101010101" pitchFamily="2" charset="-122"/>
               </a:rPr>
               <a:t>UDP</a:t>
             </a:r>
@@ -6150,6 +6680,8 @@
                 <a:solidFill>
                   <a:schemeClr val="tx1"/>
                 </a:solidFill>
+                <a:latin typeface="宋体" panose="02010600030101010101" pitchFamily="2" charset="-122"/>
+                <a:ea typeface="宋体" panose="02010600030101010101" pitchFamily="2" charset="-122"/>
               </a:rPr>
               <a:t>推流</a:t>
             </a:r>
@@ -6159,7 +6691,7 @@
     </p:spTree>
     <p:extLst>
       <p:ext uri="{BB962C8B-B14F-4D97-AF65-F5344CB8AC3E}">
-        <p14:creationId xmlns:p14="http://schemas.microsoft.com/office/powerpoint/2010/main" val="3196564168"/>
+        <p14:creationId xmlns:p14="http://schemas.microsoft.com/office/powerpoint/2010/main" val="2654970704"/>
       </p:ext>
     </p:extLst>
   </p:cSld>
@@ -6200,12 +6732,18 @@
         </p:nvSpPr>
         <p:spPr>
           <a:xfrm>
-            <a:off x="2861310" y="2637770"/>
+            <a:off x="2853692" y="2637770"/>
             <a:ext cx="1257300" cy="693420"/>
           </a:xfrm>
           <a:prstGeom prst="roundRect">
             <a:avLst/>
           </a:prstGeom>
+          <a:noFill/>
+          <a:ln w="19050">
+            <a:solidFill>
+              <a:schemeClr val="tx1"/>
+            </a:solidFill>
+          </a:ln>
         </p:spPr>
         <p:style>
           <a:lnRef idx="2">
@@ -6233,6 +6771,8 @@
                 <a:solidFill>
                   <a:schemeClr val="tx1"/>
                 </a:solidFill>
+                <a:latin typeface="宋体" panose="02010600030101010101" pitchFamily="2" charset="-122"/>
+                <a:ea typeface="宋体" panose="02010600030101010101" pitchFamily="2" charset="-122"/>
               </a:rPr>
               <a:t>UDP</a:t>
             </a:r>
@@ -6241,6 +6781,8 @@
                 <a:solidFill>
                   <a:schemeClr val="tx1"/>
                 </a:solidFill>
+                <a:latin typeface="宋体" panose="02010600030101010101" pitchFamily="2" charset="-122"/>
+                <a:ea typeface="宋体" panose="02010600030101010101" pitchFamily="2" charset="-122"/>
               </a:rPr>
               <a:t>流</a:t>
             </a:r>
@@ -6267,6 +6809,12 @@
           <a:prstGeom prst="roundRect">
             <a:avLst/>
           </a:prstGeom>
+          <a:noFill/>
+          <a:ln w="19050">
+            <a:solidFill>
+              <a:schemeClr val="tx1"/>
+            </a:solidFill>
+          </a:ln>
         </p:spPr>
         <p:style>
           <a:lnRef idx="2">
@@ -6294,6 +6842,8 @@
                 <a:solidFill>
                   <a:schemeClr val="tx1"/>
                 </a:solidFill>
+                <a:latin typeface="宋体" panose="02010600030101010101" pitchFamily="2" charset="-122"/>
+                <a:ea typeface="宋体" panose="02010600030101010101" pitchFamily="2" charset="-122"/>
               </a:rPr>
               <a:t>视频帧预处理</a:t>
             </a:r>
@@ -6321,8 +6871,16 @@
             <a:avLst/>
           </a:prstGeom>
           <a:solidFill>
-            <a:schemeClr val="accent1"/>
+            <a:schemeClr val="accent5">
+              <a:lumMod val="40000"/>
+              <a:lumOff val="60000"/>
+            </a:schemeClr>
           </a:solidFill>
+          <a:ln>
+            <a:solidFill>
+              <a:schemeClr val="tx1"/>
+            </a:solidFill>
+          </a:ln>
         </p:spPr>
         <p:style>
           <a:lnRef idx="2">
@@ -6345,7 +6903,10 @@
           <a:lstStyle/>
           <a:p>
             <a:pPr algn="ctr"/>
-            <a:endParaRPr lang="zh-CN" altLang="en-US"/>
+            <a:endParaRPr lang="zh-CN" altLang="en-US">
+              <a:latin typeface="宋体" panose="02010600030101010101" pitchFamily="2" charset="-122"/>
+              <a:ea typeface="宋体" panose="02010600030101010101" pitchFamily="2" charset="-122"/>
+            </a:endParaRPr>
           </a:p>
         </p:txBody>
       </p:sp>
@@ -6369,6 +6930,17 @@
           <a:prstGeom prst="rightArrow">
             <a:avLst/>
           </a:prstGeom>
+          <a:solidFill>
+            <a:schemeClr val="accent5">
+              <a:lumMod val="40000"/>
+              <a:lumOff val="60000"/>
+            </a:schemeClr>
+          </a:solidFill>
+          <a:ln>
+            <a:solidFill>
+              <a:schemeClr val="tx1"/>
+            </a:solidFill>
+          </a:ln>
         </p:spPr>
         <p:style>
           <a:lnRef idx="2">
@@ -6391,7 +6963,10 @@
           <a:lstStyle/>
           <a:p>
             <a:pPr algn="ctr"/>
-            <a:endParaRPr lang="zh-CN" altLang="en-US"/>
+            <a:endParaRPr lang="zh-CN" altLang="en-US">
+              <a:latin typeface="宋体" panose="02010600030101010101" pitchFamily="2" charset="-122"/>
+              <a:ea typeface="宋体" panose="02010600030101010101" pitchFamily="2" charset="-122"/>
+            </a:endParaRPr>
           </a:p>
         </p:txBody>
       </p:sp>
@@ -6415,6 +6990,12 @@
           <a:prstGeom prst="roundRect">
             <a:avLst/>
           </a:prstGeom>
+          <a:noFill/>
+          <a:ln w="19050">
+            <a:solidFill>
+              <a:schemeClr val="tx1"/>
+            </a:solidFill>
+          </a:ln>
         </p:spPr>
         <p:style>
           <a:lnRef idx="2">
@@ -6442,6 +7023,8 @@
                 <a:solidFill>
                   <a:schemeClr val="tx1"/>
                 </a:solidFill>
+                <a:latin typeface="宋体" panose="02010600030101010101" pitchFamily="2" charset="-122"/>
+                <a:ea typeface="宋体" panose="02010600030101010101" pitchFamily="2" charset="-122"/>
               </a:rPr>
               <a:t>视频编码</a:t>
             </a:r>
@@ -6468,6 +7051,12 @@
           <a:prstGeom prst="roundRect">
             <a:avLst/>
           </a:prstGeom>
+          <a:noFill/>
+          <a:ln w="19050">
+            <a:solidFill>
+              <a:schemeClr val="tx1"/>
+            </a:solidFill>
+          </a:ln>
         </p:spPr>
         <p:style>
           <a:lnRef idx="2">
@@ -6495,6 +7084,8 @@
                 <a:solidFill>
                   <a:schemeClr val="tx1"/>
                 </a:solidFill>
+                <a:latin typeface="宋体" panose="02010600030101010101" pitchFamily="2" charset="-122"/>
+                <a:ea typeface="宋体" panose="02010600030101010101" pitchFamily="2" charset="-122"/>
               </a:rPr>
               <a:t>MP4</a:t>
             </a:r>
@@ -6503,6 +7094,8 @@
                 <a:solidFill>
                   <a:schemeClr val="tx1"/>
                 </a:solidFill>
+                <a:latin typeface="宋体" panose="02010600030101010101" pitchFamily="2" charset="-122"/>
+                <a:ea typeface="宋体" panose="02010600030101010101" pitchFamily="2" charset="-122"/>
               </a:rPr>
               <a:t>文件</a:t>
             </a:r>
@@ -6510,6 +7103,8 @@
               <a:solidFill>
                 <a:schemeClr val="tx1"/>
               </a:solidFill>
+              <a:latin typeface="宋体" panose="02010600030101010101" pitchFamily="2" charset="-122"/>
+              <a:ea typeface="宋体" panose="02010600030101010101" pitchFamily="2" charset="-122"/>
             </a:endParaRPr>
           </a:p>
         </p:txBody>
@@ -6535,6 +7130,11 @@
             <a:avLst/>
           </a:prstGeom>
           <a:noFill/>
+          <a:ln w="28575">
+            <a:solidFill>
+              <a:schemeClr val="tx1"/>
+            </a:solidFill>
+          </a:ln>
         </p:spPr>
         <p:style>
           <a:lnRef idx="2">
@@ -6557,7 +7157,10 @@
           <a:lstStyle/>
           <a:p>
             <a:pPr algn="ctr"/>
-            <a:endParaRPr lang="zh-CN" altLang="en-US"/>
+            <a:endParaRPr lang="zh-CN" altLang="en-US">
+              <a:latin typeface="宋体" panose="02010600030101010101" pitchFamily="2" charset="-122"/>
+              <a:ea typeface="宋体" panose="02010600030101010101" pitchFamily="2" charset="-122"/>
+            </a:endParaRPr>
           </a:p>
         </p:txBody>
       </p:sp>
@@ -6575,7 +7178,7 @@
         </p:nvSpPr>
         <p:spPr>
           <a:xfrm>
-            <a:off x="5073492" y="247650"/>
+            <a:off x="5275422" y="1704320"/>
             <a:ext cx="1641156" cy="523220"/>
           </a:xfrm>
           <a:prstGeom prst="rect">
@@ -6590,8 +7193,9 @@
           <a:lstStyle/>
           <a:p>
             <a:r>
-              <a:rPr lang="zh-CN" altLang="en-US" sz="2800" b="1" dirty="0">
-                <a:latin typeface="Times New Roman" panose="02020603050405020304" pitchFamily="18" charset="0"/>
+              <a:rPr lang="zh-CN" altLang="en-US" sz="2800" dirty="0">
+                <a:latin typeface="宋体" panose="02010600030101010101" pitchFamily="2" charset="-122"/>
+                <a:ea typeface="宋体" panose="02010600030101010101" pitchFamily="2" charset="-122"/>
                 <a:cs typeface="Times New Roman" panose="02020603050405020304" pitchFamily="18" charset="0"/>
               </a:rPr>
               <a:t>文件保存</a:t>
@@ -6619,6 +7223,17 @@
           <a:prstGeom prst="rightArrow">
             <a:avLst/>
           </a:prstGeom>
+          <a:solidFill>
+            <a:schemeClr val="accent5">
+              <a:lumMod val="40000"/>
+              <a:lumOff val="60000"/>
+            </a:schemeClr>
+          </a:solidFill>
+          <a:ln>
+            <a:solidFill>
+              <a:schemeClr val="tx1"/>
+            </a:solidFill>
+          </a:ln>
         </p:spPr>
         <p:style>
           <a:lnRef idx="2">
@@ -6641,7 +7256,10 @@
           <a:lstStyle/>
           <a:p>
             <a:pPr algn="ctr"/>
-            <a:endParaRPr lang="zh-CN" altLang="en-US"/>
+            <a:endParaRPr lang="zh-CN" altLang="en-US">
+              <a:latin typeface="宋体" panose="02010600030101010101" pitchFamily="2" charset="-122"/>
+              <a:ea typeface="宋体" panose="02010600030101010101" pitchFamily="2" charset="-122"/>
+            </a:endParaRPr>
           </a:p>
         </p:txBody>
       </p:sp>
@@ -6666,8 +7284,16 @@
             <a:avLst/>
           </a:prstGeom>
           <a:solidFill>
-            <a:schemeClr val="accent1"/>
+            <a:schemeClr val="accent5">
+              <a:lumMod val="40000"/>
+              <a:lumOff val="60000"/>
+            </a:schemeClr>
           </a:solidFill>
+          <a:ln>
+            <a:solidFill>
+              <a:schemeClr val="tx1"/>
+            </a:solidFill>
+          </a:ln>
         </p:spPr>
         <p:style>
           <a:lnRef idx="2">
@@ -6690,7 +7316,10 @@
           <a:lstStyle/>
           <a:p>
             <a:pPr algn="ctr"/>
-            <a:endParaRPr lang="zh-CN" altLang="en-US"/>
+            <a:endParaRPr lang="zh-CN" altLang="en-US">
+              <a:latin typeface="宋体" panose="02010600030101010101" pitchFamily="2" charset="-122"/>
+              <a:ea typeface="宋体" panose="02010600030101010101" pitchFamily="2" charset="-122"/>
+            </a:endParaRPr>
           </a:p>
         </p:txBody>
       </p:sp>
@@ -6723,10 +7352,16 @@
           <a:lstStyle/>
           <a:p>
             <a:r>
-              <a:rPr lang="zh-CN" altLang="en-US" dirty="0"/>
+              <a:rPr lang="zh-CN" altLang="en-US" dirty="0">
+                <a:latin typeface="宋体" panose="02010600030101010101" pitchFamily="2" charset="-122"/>
+                <a:ea typeface="宋体" panose="02010600030101010101" pitchFamily="2" charset="-122"/>
+              </a:rPr>
               <a:t>执行进程</a:t>
             </a:r>
-            <a:endParaRPr lang="en-US" altLang="zh-CN" dirty="0"/>
+            <a:endParaRPr lang="en-US" altLang="zh-CN" dirty="0">
+              <a:latin typeface="宋体" panose="02010600030101010101" pitchFamily="2" charset="-122"/>
+              <a:ea typeface="宋体" panose="02010600030101010101" pitchFamily="2" charset="-122"/>
+            </a:endParaRPr>
           </a:p>
         </p:txBody>
       </p:sp>
@@ -6744,15 +7379,23 @@
         </p:nvSpPr>
         <p:spPr>
           <a:xfrm rot="16200000">
-            <a:off x="8379736" y="4109443"/>
-            <a:ext cx="2697480" cy="422193"/>
+            <a:off x="8726447" y="3762733"/>
+            <a:ext cx="2004060" cy="422193"/>
           </a:xfrm>
           <a:prstGeom prst="rightArrow">
             <a:avLst/>
           </a:prstGeom>
           <a:solidFill>
-            <a:schemeClr val="accent1"/>
+            <a:schemeClr val="accent5">
+              <a:lumMod val="40000"/>
+              <a:lumOff val="60000"/>
+            </a:schemeClr>
           </a:solidFill>
+          <a:ln>
+            <a:solidFill>
+              <a:schemeClr val="tx1"/>
+            </a:solidFill>
+          </a:ln>
         </p:spPr>
         <p:style>
           <a:lnRef idx="2">
@@ -6775,7 +7418,10 @@
           <a:lstStyle/>
           <a:p>
             <a:pPr algn="ctr"/>
-            <a:endParaRPr lang="zh-CN" altLang="en-US"/>
+            <a:endParaRPr lang="zh-CN" altLang="en-US">
+              <a:latin typeface="宋体" panose="02010600030101010101" pitchFamily="2" charset="-122"/>
+              <a:ea typeface="宋体" panose="02010600030101010101" pitchFamily="2" charset="-122"/>
+            </a:endParaRPr>
           </a:p>
         </p:txBody>
       </p:sp>
@@ -6793,7 +7439,7 @@
         </p:nvSpPr>
         <p:spPr>
           <a:xfrm>
-            <a:off x="8051437" y="4546699"/>
+            <a:off x="8052507" y="4414003"/>
             <a:ext cx="1558138" cy="369332"/>
           </a:xfrm>
           <a:prstGeom prst="rect">
@@ -6808,10 +7454,16 @@
           <a:lstStyle/>
           <a:p>
             <a:r>
-              <a:rPr lang="zh-CN" altLang="en-US" dirty="0"/>
+              <a:rPr lang="zh-CN" altLang="en-US" dirty="0">
+                <a:latin typeface="宋体" panose="02010600030101010101" pitchFamily="2" charset="-122"/>
+                <a:ea typeface="宋体" panose="02010600030101010101" pitchFamily="2" charset="-122"/>
+              </a:rPr>
               <a:t>中断进程信号</a:t>
             </a:r>
-            <a:endParaRPr lang="en-US" altLang="zh-CN" dirty="0"/>
+            <a:endParaRPr lang="en-US" altLang="zh-CN" dirty="0">
+              <a:latin typeface="宋体" panose="02010600030101010101" pitchFamily="2" charset="-122"/>
+              <a:ea typeface="宋体" panose="02010600030101010101" pitchFamily="2" charset="-122"/>
+            </a:endParaRPr>
           </a:p>
         </p:txBody>
       </p:sp>
@@ -6836,8 +7488,16 @@
             <a:avLst/>
           </a:prstGeom>
           <a:solidFill>
-            <a:schemeClr val="accent1"/>
+            <a:schemeClr val="accent5">
+              <a:lumMod val="40000"/>
+              <a:lumOff val="60000"/>
+            </a:schemeClr>
           </a:solidFill>
+          <a:ln>
+            <a:solidFill>
+              <a:schemeClr val="tx1"/>
+            </a:solidFill>
+          </a:ln>
         </p:spPr>
         <p:style>
           <a:lnRef idx="2">
@@ -6860,7 +7520,10 @@
           <a:lstStyle/>
           <a:p>
             <a:pPr algn="ctr"/>
-            <a:endParaRPr lang="zh-CN" altLang="en-US"/>
+            <a:endParaRPr lang="zh-CN" altLang="en-US">
+              <a:latin typeface="宋体" panose="02010600030101010101" pitchFamily="2" charset="-122"/>
+              <a:ea typeface="宋体" panose="02010600030101010101" pitchFamily="2" charset="-122"/>
+            </a:endParaRPr>
           </a:p>
         </p:txBody>
       </p:sp>
@@ -6893,17 +7556,23 @@
           <a:lstStyle/>
           <a:p>
             <a:r>
-              <a:rPr lang="zh-CN" altLang="en-US" dirty="0"/>
+              <a:rPr lang="zh-CN" altLang="en-US" dirty="0">
+                <a:latin typeface="宋体" panose="02010600030101010101" pitchFamily="2" charset="-122"/>
+                <a:ea typeface="宋体" panose="02010600030101010101" pitchFamily="2" charset="-122"/>
+              </a:rPr>
               <a:t>输出视频文件</a:t>
             </a:r>
-            <a:endParaRPr lang="en-US" altLang="zh-CN" dirty="0"/>
+            <a:endParaRPr lang="en-US" altLang="zh-CN" dirty="0">
+              <a:latin typeface="宋体" panose="02010600030101010101" pitchFamily="2" charset="-122"/>
+              <a:ea typeface="宋体" panose="02010600030101010101" pitchFamily="2" charset="-122"/>
+            </a:endParaRPr>
           </a:p>
         </p:txBody>
       </p:sp>
     </p:spTree>
     <p:extLst>
       <p:ext uri="{BB962C8B-B14F-4D97-AF65-F5344CB8AC3E}">
-        <p14:creationId xmlns:p14="http://schemas.microsoft.com/office/powerpoint/2010/main" val="501488747"/>
+        <p14:creationId xmlns:p14="http://schemas.microsoft.com/office/powerpoint/2010/main" val="3745294283"/>
       </p:ext>
     </p:extLst>
   </p:cSld>
@@ -6944,13 +7613,18 @@
         </p:nvSpPr>
         <p:spPr>
           <a:xfrm>
-            <a:off x="3897628" y="1473542"/>
-            <a:ext cx="4251960" cy="4846320"/>
+            <a:off x="3897628" y="1676400"/>
+            <a:ext cx="4251960" cy="3924300"/>
           </a:xfrm>
           <a:prstGeom prst="roundRect">
             <a:avLst/>
           </a:prstGeom>
           <a:noFill/>
+          <a:ln w="28575">
+            <a:solidFill>
+              <a:schemeClr val="tx1"/>
+            </a:solidFill>
+          </a:ln>
         </p:spPr>
         <p:style>
           <a:lnRef idx="2">
@@ -6973,16 +7647,19 @@
           <a:lstStyle/>
           <a:p>
             <a:pPr algn="ctr"/>
-            <a:endParaRPr lang="zh-CN" altLang="en-US"/>
-          </a:p>
-        </p:txBody>
-      </p:sp>
-      <p:sp>
-        <p:nvSpPr>
-          <p:cNvPr id="29" name="文本框 28">
-            <a:extLst>
-              <a:ext uri="{FF2B5EF4-FFF2-40B4-BE49-F238E27FC236}">
-                <a16:creationId xmlns:a16="http://schemas.microsoft.com/office/drawing/2014/main" id="{ACB69324-7CCE-4FCF-91DA-AA2660338F4A}"/>
+            <a:endParaRPr lang="zh-CN" altLang="en-US">
+              <a:latin typeface="宋体" panose="02010600030101010101" pitchFamily="2" charset="-122"/>
+              <a:ea typeface="宋体" panose="02010600030101010101" pitchFamily="2" charset="-122"/>
+            </a:endParaRPr>
+          </a:p>
+        </p:txBody>
+      </p:sp>
+      <p:sp>
+        <p:nvSpPr>
+          <p:cNvPr id="26" name="文本框 25">
+            <a:extLst>
+              <a:ext uri="{FF2B5EF4-FFF2-40B4-BE49-F238E27FC236}">
+                <a16:creationId xmlns:a16="http://schemas.microsoft.com/office/drawing/2014/main" id="{1289B2EC-8387-46CD-B32A-A1DDED5D0C30}"/>
               </a:ext>
             </a:extLst>
           </p:cNvPr>
@@ -6991,8 +7668,8 @@
         </p:nvSpPr>
         <p:spPr>
           <a:xfrm>
-            <a:off x="5250180" y="254980"/>
-            <a:ext cx="1546860" cy="523220"/>
+            <a:off x="4901341" y="1763872"/>
+            <a:ext cx="2244533" cy="369332"/>
           </a:xfrm>
           <a:prstGeom prst="rect">
             <a:avLst/>
@@ -7005,57 +7682,18 @@
           </a:bodyPr>
           <a:lstStyle/>
           <a:p>
-            <a:r>
-              <a:rPr lang="en-US" altLang="zh-CN" sz="2800" b="1" dirty="0">
-                <a:latin typeface="Times New Roman" panose="02020603050405020304" pitchFamily="18" charset="0"/>
-                <a:cs typeface="Times New Roman" panose="02020603050405020304" pitchFamily="18" charset="0"/>
+            <a:pPr algn="ctr"/>
+            <a:r>
+              <a:rPr lang="zh-CN" altLang="en-US" dirty="0">
+                <a:latin typeface="宋体" panose="02010600030101010101" pitchFamily="2" charset="-122"/>
+                <a:ea typeface="宋体" panose="02010600030101010101" pitchFamily="2" charset="-122"/>
               </a:rPr>
-              <a:t>MQTT</a:t>
-            </a:r>
-            <a:endParaRPr lang="zh-CN" altLang="en-US" sz="2800" b="1" dirty="0">
-              <a:latin typeface="Times New Roman" panose="02020603050405020304" pitchFamily="18" charset="0"/>
-              <a:cs typeface="Times New Roman" panose="02020603050405020304" pitchFamily="18" charset="0"/>
+              <a:t>文件和信息云服务器</a:t>
+            </a:r>
+            <a:endParaRPr lang="en-US" altLang="zh-CN" dirty="0">
+              <a:latin typeface="宋体" panose="02010600030101010101" pitchFamily="2" charset="-122"/>
+              <a:ea typeface="宋体" panose="02010600030101010101" pitchFamily="2" charset="-122"/>
             </a:endParaRPr>
-          </a:p>
-        </p:txBody>
-      </p:sp>
-      <p:sp>
-        <p:nvSpPr>
-          <p:cNvPr id="26" name="文本框 25">
-            <a:extLst>
-              <a:ext uri="{FF2B5EF4-FFF2-40B4-BE49-F238E27FC236}">
-                <a16:creationId xmlns:a16="http://schemas.microsoft.com/office/drawing/2014/main" id="{1289B2EC-8387-46CD-B32A-A1DDED5D0C30}"/>
-              </a:ext>
-            </a:extLst>
-          </p:cNvPr>
-          <p:cNvSpPr txBox="1"/>
-          <p:nvPr/>
-        </p:nvSpPr>
-        <p:spPr>
-          <a:xfrm>
-            <a:off x="4758247" y="1506391"/>
-            <a:ext cx="2530723" cy="369332"/>
-          </a:xfrm>
-          <a:prstGeom prst="rect">
-            <a:avLst/>
-          </a:prstGeom>
-          <a:noFill/>
-        </p:spPr>
-        <p:txBody>
-          <a:bodyPr wrap="square" rtlCol="0">
-            <a:spAutoFit/>
-          </a:bodyPr>
-          <a:lstStyle/>
-          <a:p>
-            <a:r>
-              <a:rPr lang="en-US" altLang="zh-CN" dirty="0"/>
-              <a:t>MQTT Broker/</a:t>
-            </a:r>
-            <a:r>
-              <a:rPr lang="zh-CN" altLang="en-US" dirty="0"/>
-              <a:t>云服务器</a:t>
-            </a:r>
-            <a:endParaRPr lang="en-US" altLang="zh-CN" dirty="0"/>
           </a:p>
         </p:txBody>
       </p:sp>
@@ -7079,6 +7717,12 @@
           <a:prstGeom prst="roundRect">
             <a:avLst/>
           </a:prstGeom>
+          <a:noFill/>
+          <a:ln w="19050">
+            <a:solidFill>
+              <a:schemeClr val="tx1"/>
+            </a:solidFill>
+          </a:ln>
         </p:spPr>
         <p:style>
           <a:lnRef idx="2">
@@ -7102,10 +7746,12 @@
           <a:p>
             <a:pPr algn="ctr"/>
             <a:r>
-              <a:rPr lang="en-US" altLang="zh-CN" sz="1600" dirty="0" err="1">
+              <a:rPr lang="en-US" altLang="zh-CN" sz="1600" dirty="0">
                 <a:solidFill>
                   <a:schemeClr val="tx1"/>
                 </a:solidFill>
+                <a:latin typeface="宋体" panose="02010600030101010101" pitchFamily="2" charset="-122"/>
+                <a:ea typeface="宋体" panose="02010600030101010101" pitchFamily="2" charset="-122"/>
               </a:rPr>
               <a:t>DeepStream</a:t>
             </a:r>
@@ -7114,8 +7760,10 @@
                 <a:solidFill>
                   <a:schemeClr val="tx1"/>
                 </a:solidFill>
+                <a:latin typeface="宋体" panose="02010600030101010101" pitchFamily="2" charset="-122"/>
+                <a:ea typeface="宋体" panose="02010600030101010101" pitchFamily="2" charset="-122"/>
               </a:rPr>
-              <a:t>部分</a:t>
+              <a:t>管道</a:t>
             </a:r>
           </a:p>
         </p:txBody>
@@ -7140,6 +7788,17 @@
           <a:prstGeom prst="upDownArrow">
             <a:avLst/>
           </a:prstGeom>
+          <a:solidFill>
+            <a:schemeClr val="accent5">
+              <a:lumMod val="40000"/>
+              <a:lumOff val="60000"/>
+            </a:schemeClr>
+          </a:solidFill>
+          <a:ln w="19050">
+            <a:solidFill>
+              <a:schemeClr val="tx1"/>
+            </a:solidFill>
+          </a:ln>
         </p:spPr>
         <p:style>
           <a:lnRef idx="2">
@@ -7162,7 +7821,10 @@
           <a:lstStyle/>
           <a:p>
             <a:pPr algn="ctr"/>
-            <a:endParaRPr lang="zh-CN" altLang="en-US"/>
+            <a:endParaRPr lang="zh-CN" altLang="en-US">
+              <a:latin typeface="宋体" panose="02010600030101010101" pitchFamily="2" charset="-122"/>
+              <a:ea typeface="宋体" panose="02010600030101010101" pitchFamily="2" charset="-122"/>
+            </a:endParaRPr>
           </a:p>
         </p:txBody>
       </p:sp>
@@ -7186,6 +7848,12 @@
           <a:prstGeom prst="roundRect">
             <a:avLst/>
           </a:prstGeom>
+          <a:noFill/>
+          <a:ln w="19050">
+            <a:solidFill>
+              <a:schemeClr val="tx1"/>
+            </a:solidFill>
+          </a:ln>
         </p:spPr>
         <p:style>
           <a:lnRef idx="2">
@@ -7213,6 +7881,8 @@
                 <a:solidFill>
                   <a:schemeClr val="tx1"/>
                 </a:solidFill>
+                <a:latin typeface="宋体" panose="02010600030101010101" pitchFamily="2" charset="-122"/>
+                <a:ea typeface="宋体" panose="02010600030101010101" pitchFamily="2" charset="-122"/>
               </a:rPr>
               <a:t>数据库</a:t>
             </a:r>
@@ -7239,6 +7909,12 @@
           <a:prstGeom prst="roundRect">
             <a:avLst/>
           </a:prstGeom>
+          <a:noFill/>
+          <a:ln w="19050">
+            <a:solidFill>
+              <a:schemeClr val="tx1"/>
+            </a:solidFill>
+          </a:ln>
         </p:spPr>
         <p:style>
           <a:lnRef idx="2">
@@ -7266,6 +7942,8 @@
                 <a:solidFill>
                   <a:schemeClr val="tx1"/>
                 </a:solidFill>
+                <a:latin typeface="宋体" panose="02010600030101010101" pitchFamily="2" charset="-122"/>
+                <a:ea typeface="宋体" panose="02010600030101010101" pitchFamily="2" charset="-122"/>
               </a:rPr>
               <a:t>后端框架</a:t>
             </a:r>
@@ -7292,6 +7970,12 @@
           <a:prstGeom prst="roundRect">
             <a:avLst/>
           </a:prstGeom>
+          <a:noFill/>
+          <a:ln w="19050">
+            <a:solidFill>
+              <a:schemeClr val="tx1"/>
+            </a:solidFill>
+          </a:ln>
         </p:spPr>
         <p:style>
           <a:lnRef idx="2">
@@ -7319,6 +8003,8 @@
                 <a:solidFill>
                   <a:schemeClr val="tx1"/>
                 </a:solidFill>
+                <a:latin typeface="宋体" panose="02010600030101010101" pitchFamily="2" charset="-122"/>
+                <a:ea typeface="宋体" panose="02010600030101010101" pitchFamily="2" charset="-122"/>
               </a:rPr>
               <a:t>MQTT</a:t>
             </a:r>
@@ -7327,6 +8013,8 @@
                 <a:solidFill>
                   <a:schemeClr val="tx1"/>
                 </a:solidFill>
+                <a:latin typeface="宋体" panose="02010600030101010101" pitchFamily="2" charset="-122"/>
+                <a:ea typeface="宋体" panose="02010600030101010101" pitchFamily="2" charset="-122"/>
               </a:rPr>
               <a:t>订阅</a:t>
             </a:r>
@@ -7362,10 +8050,16 @@
           <a:lstStyle/>
           <a:p>
             <a:r>
-              <a:rPr lang="zh-CN" altLang="en-US" dirty="0"/>
+              <a:rPr lang="zh-CN" altLang="en-US" dirty="0">
+                <a:latin typeface="宋体" panose="02010600030101010101" pitchFamily="2" charset="-122"/>
+                <a:ea typeface="宋体" panose="02010600030101010101" pitchFamily="2" charset="-122"/>
+              </a:rPr>
               <a:t>发送异常信息</a:t>
             </a:r>
-            <a:endParaRPr lang="en-US" altLang="zh-CN" dirty="0"/>
+            <a:endParaRPr lang="en-US" altLang="zh-CN" dirty="0">
+              <a:latin typeface="宋体" panose="02010600030101010101" pitchFamily="2" charset="-122"/>
+              <a:ea typeface="宋体" panose="02010600030101010101" pitchFamily="2" charset="-122"/>
+            </a:endParaRPr>
           </a:p>
         </p:txBody>
       </p:sp>
@@ -7393,6 +8087,17 @@
               <a:gd name="adj3" fmla="val 19428"/>
             </a:avLst>
           </a:prstGeom>
+          <a:solidFill>
+            <a:schemeClr val="accent5">
+              <a:lumMod val="40000"/>
+              <a:lumOff val="60000"/>
+            </a:schemeClr>
+          </a:solidFill>
+          <a:ln w="19050">
+            <a:solidFill>
+              <a:schemeClr val="tx1"/>
+            </a:solidFill>
+          </a:ln>
         </p:spPr>
         <p:style>
           <a:lnRef idx="2">
@@ -7415,7 +8120,10 @@
           <a:lstStyle/>
           <a:p>
             <a:pPr algn="ctr"/>
-            <a:endParaRPr lang="zh-CN" altLang="en-US"/>
+            <a:endParaRPr lang="zh-CN" altLang="en-US">
+              <a:latin typeface="宋体" panose="02010600030101010101" pitchFamily="2" charset="-122"/>
+              <a:ea typeface="宋体" panose="02010600030101010101" pitchFamily="2" charset="-122"/>
+            </a:endParaRPr>
           </a:p>
         </p:txBody>
       </p:sp>
@@ -7439,6 +8147,17 @@
           <a:prstGeom prst="downArrow">
             <a:avLst/>
           </a:prstGeom>
+          <a:solidFill>
+            <a:schemeClr val="accent5">
+              <a:lumMod val="40000"/>
+              <a:lumOff val="60000"/>
+            </a:schemeClr>
+          </a:solidFill>
+          <a:ln w="19050">
+            <a:solidFill>
+              <a:schemeClr val="tx1"/>
+            </a:solidFill>
+          </a:ln>
         </p:spPr>
         <p:style>
           <a:lnRef idx="2">
@@ -7461,7 +8180,10 @@
           <a:lstStyle/>
           <a:p>
             <a:pPr algn="ctr"/>
-            <a:endParaRPr lang="zh-CN" altLang="en-US"/>
+            <a:endParaRPr lang="zh-CN" altLang="en-US">
+              <a:latin typeface="宋体" panose="02010600030101010101" pitchFamily="2" charset="-122"/>
+              <a:ea typeface="宋体" panose="02010600030101010101" pitchFamily="2" charset="-122"/>
+            </a:endParaRPr>
           </a:p>
         </p:txBody>
       </p:sp>
@@ -7485,6 +8207,17 @@
           <a:prstGeom prst="rightArrow">
             <a:avLst/>
           </a:prstGeom>
+          <a:solidFill>
+            <a:schemeClr val="accent5">
+              <a:lumMod val="40000"/>
+              <a:lumOff val="60000"/>
+            </a:schemeClr>
+          </a:solidFill>
+          <a:ln w="19050">
+            <a:solidFill>
+              <a:schemeClr val="tx1"/>
+            </a:solidFill>
+          </a:ln>
         </p:spPr>
         <p:style>
           <a:lnRef idx="2">
@@ -7507,7 +8240,10 @@
           <a:lstStyle/>
           <a:p>
             <a:pPr algn="ctr"/>
-            <a:endParaRPr lang="zh-CN" altLang="en-US"/>
+            <a:endParaRPr lang="zh-CN" altLang="en-US">
+              <a:latin typeface="宋体" panose="02010600030101010101" pitchFamily="2" charset="-122"/>
+              <a:ea typeface="宋体" panose="02010600030101010101" pitchFamily="2" charset="-122"/>
+            </a:endParaRPr>
           </a:p>
         </p:txBody>
       </p:sp>
@@ -7531,6 +8267,12 @@
           <a:prstGeom prst="roundRect">
             <a:avLst/>
           </a:prstGeom>
+          <a:noFill/>
+          <a:ln w="19050">
+            <a:solidFill>
+              <a:schemeClr val="tx1"/>
+            </a:solidFill>
+          </a:ln>
         </p:spPr>
         <p:style>
           <a:lnRef idx="2">
@@ -7558,6 +8300,8 @@
                 <a:solidFill>
                   <a:schemeClr val="tx1"/>
                 </a:solidFill>
+                <a:latin typeface="宋体" panose="02010600030101010101" pitchFamily="2" charset="-122"/>
+                <a:ea typeface="宋体" panose="02010600030101010101" pitchFamily="2" charset="-122"/>
               </a:rPr>
               <a:t>APP/WEB/</a:t>
             </a:r>
@@ -7566,6 +8310,8 @@
                 <a:solidFill>
                   <a:schemeClr val="tx1"/>
                 </a:solidFill>
+                <a:latin typeface="宋体" panose="02010600030101010101" pitchFamily="2" charset="-122"/>
+                <a:ea typeface="宋体" panose="02010600030101010101" pitchFamily="2" charset="-122"/>
               </a:rPr>
               <a:t>微信小程序</a:t>
             </a:r>
@@ -7601,10 +8347,16 @@
           <a:lstStyle/>
           <a:p>
             <a:r>
-              <a:rPr lang="zh-CN" altLang="en-US" dirty="0"/>
+              <a:rPr lang="zh-CN" altLang="en-US" dirty="0">
+                <a:latin typeface="宋体" panose="02010600030101010101" pitchFamily="2" charset="-122"/>
+                <a:ea typeface="宋体" panose="02010600030101010101" pitchFamily="2" charset="-122"/>
+              </a:rPr>
               <a:t>前端</a:t>
             </a:r>
-            <a:endParaRPr lang="en-US" altLang="zh-CN" dirty="0"/>
+            <a:endParaRPr lang="en-US" altLang="zh-CN" dirty="0">
+              <a:latin typeface="宋体" panose="02010600030101010101" pitchFamily="2" charset="-122"/>
+              <a:ea typeface="宋体" panose="02010600030101010101" pitchFamily="2" charset="-122"/>
+            </a:endParaRPr>
           </a:p>
         </p:txBody>
       </p:sp>
@@ -7628,6 +8380,17 @@
           <a:prstGeom prst="rightArrow">
             <a:avLst/>
           </a:prstGeom>
+          <a:solidFill>
+            <a:schemeClr val="accent5">
+              <a:lumMod val="40000"/>
+              <a:lumOff val="60000"/>
+            </a:schemeClr>
+          </a:solidFill>
+          <a:ln w="19050">
+            <a:solidFill>
+              <a:schemeClr val="tx1"/>
+            </a:solidFill>
+          </a:ln>
         </p:spPr>
         <p:style>
           <a:lnRef idx="2">
@@ -7650,7 +8413,10 @@
           <a:lstStyle/>
           <a:p>
             <a:pPr algn="ctr"/>
-            <a:endParaRPr lang="zh-CN" altLang="en-US"/>
+            <a:endParaRPr lang="zh-CN" altLang="en-US">
+              <a:latin typeface="宋体" panose="02010600030101010101" pitchFamily="2" charset="-122"/>
+              <a:ea typeface="宋体" panose="02010600030101010101" pitchFamily="2" charset="-122"/>
+            </a:endParaRPr>
           </a:p>
         </p:txBody>
       </p:sp>
@@ -7674,6 +8440,17 @@
           <a:prstGeom prst="rightArrow">
             <a:avLst/>
           </a:prstGeom>
+          <a:solidFill>
+            <a:schemeClr val="accent5">
+              <a:lumMod val="40000"/>
+              <a:lumOff val="60000"/>
+            </a:schemeClr>
+          </a:solidFill>
+          <a:ln w="19050">
+            <a:solidFill>
+              <a:schemeClr val="tx1"/>
+            </a:solidFill>
+          </a:ln>
         </p:spPr>
         <p:style>
           <a:lnRef idx="2">
@@ -7696,7 +8473,10 @@
           <a:lstStyle/>
           <a:p>
             <a:pPr algn="ctr"/>
-            <a:endParaRPr lang="zh-CN" altLang="en-US"/>
+            <a:endParaRPr lang="zh-CN" altLang="en-US">
+              <a:latin typeface="宋体" panose="02010600030101010101" pitchFamily="2" charset="-122"/>
+              <a:ea typeface="宋体" panose="02010600030101010101" pitchFamily="2" charset="-122"/>
+            </a:endParaRPr>
           </a:p>
         </p:txBody>
       </p:sp>
@@ -7729,10 +8509,16 @@
           <a:lstStyle/>
           <a:p>
             <a:r>
-              <a:rPr lang="zh-CN" altLang="en-US" dirty="0"/>
+              <a:rPr lang="zh-CN" altLang="en-US" dirty="0">
+                <a:latin typeface="宋体" panose="02010600030101010101" pitchFamily="2" charset="-122"/>
+                <a:ea typeface="宋体" panose="02010600030101010101" pitchFamily="2" charset="-122"/>
+              </a:rPr>
               <a:t>发送命令</a:t>
             </a:r>
-            <a:endParaRPr lang="en-US" altLang="zh-CN" dirty="0"/>
+            <a:endParaRPr lang="en-US" altLang="zh-CN" dirty="0">
+              <a:latin typeface="宋体" panose="02010600030101010101" pitchFamily="2" charset="-122"/>
+              <a:ea typeface="宋体" panose="02010600030101010101" pitchFamily="2" charset="-122"/>
+            </a:endParaRPr>
           </a:p>
         </p:txBody>
       </p:sp>
@@ -7740,6 +8526,242 @@
     <p:extLst>
       <p:ext uri="{BB962C8B-B14F-4D97-AF65-F5344CB8AC3E}">
         <p14:creationId xmlns:p14="http://schemas.microsoft.com/office/powerpoint/2010/main" val="258374609"/>
+      </p:ext>
+    </p:extLst>
+  </p:cSld>
+  <p:clrMapOvr>
+    <a:masterClrMapping/>
+  </p:clrMapOvr>
+</p:sld>
+</file>
+
+<file path=ppt/slides/slide5.xml><?xml version="1.0" encoding="utf-8"?>
+<p:sld xmlns:a="http://schemas.openxmlformats.org/drawingml/2006/main" xmlns:r="http://schemas.openxmlformats.org/officeDocument/2006/relationships" xmlns:p="http://schemas.openxmlformats.org/presentationml/2006/main">
+  <p:cSld>
+    <p:spTree>
+      <p:nvGrpSpPr>
+        <p:cNvPr id="1" name=""/>
+        <p:cNvGrpSpPr/>
+        <p:nvPr/>
+      </p:nvGrpSpPr>
+      <p:grpSpPr>
+        <a:xfrm>
+          <a:off x="0" y="0"/>
+          <a:ext cx="0" cy="0"/>
+          <a:chOff x="0" y="0"/>
+          <a:chExt cx="0" cy="0"/>
+        </a:xfrm>
+      </p:grpSpPr>
+      <p:pic>
+        <p:nvPicPr>
+          <p:cNvPr id="5" name="图片 4">
+            <a:extLst>
+              <a:ext uri="{FF2B5EF4-FFF2-40B4-BE49-F238E27FC236}">
+                <a16:creationId xmlns:a16="http://schemas.microsoft.com/office/drawing/2014/main" id="{53A6A523-8579-D283-94DA-5421C3926ACC}"/>
+              </a:ext>
+            </a:extLst>
+          </p:cNvPr>
+          <p:cNvPicPr>
+            <a:picLocks noChangeAspect="1"/>
+          </p:cNvPicPr>
+          <p:nvPr/>
+        </p:nvPicPr>
+        <p:blipFill>
+          <a:blip r:embed="rId2"/>
+          <a:stretch>
+            <a:fillRect/>
+          </a:stretch>
+        </p:blipFill>
+        <p:spPr>
+          <a:xfrm>
+            <a:off x="412900" y="579120"/>
+            <a:ext cx="5639969" cy="3070860"/>
+          </a:xfrm>
+          <a:prstGeom prst="rect">
+            <a:avLst/>
+          </a:prstGeom>
+        </p:spPr>
+      </p:pic>
+      <p:pic>
+        <p:nvPicPr>
+          <p:cNvPr id="7" name="图片 6">
+            <a:extLst>
+              <a:ext uri="{FF2B5EF4-FFF2-40B4-BE49-F238E27FC236}">
+                <a16:creationId xmlns:a16="http://schemas.microsoft.com/office/drawing/2014/main" id="{3F1A630A-DD65-AB6C-A68F-F8D3550C661D}"/>
+              </a:ext>
+            </a:extLst>
+          </p:cNvPr>
+          <p:cNvPicPr>
+            <a:picLocks noChangeAspect="1"/>
+          </p:cNvPicPr>
+          <p:nvPr/>
+        </p:nvPicPr>
+        <p:blipFill>
+          <a:blip r:embed="rId3"/>
+          <a:stretch>
+            <a:fillRect/>
+          </a:stretch>
+        </p:blipFill>
+        <p:spPr>
+          <a:xfrm>
+            <a:off x="6252470" y="1251076"/>
+            <a:ext cx="5193511" cy="2177924"/>
+          </a:xfrm>
+          <a:prstGeom prst="rect">
+            <a:avLst/>
+          </a:prstGeom>
+        </p:spPr>
+      </p:pic>
+      <p:pic>
+        <p:nvPicPr>
+          <p:cNvPr id="9" name="图片 8">
+            <a:extLst>
+              <a:ext uri="{FF2B5EF4-FFF2-40B4-BE49-F238E27FC236}">
+                <a16:creationId xmlns:a16="http://schemas.microsoft.com/office/drawing/2014/main" id="{4E73B69A-AF27-3868-A525-375F1EC37729}"/>
+              </a:ext>
+            </a:extLst>
+          </p:cNvPr>
+          <p:cNvPicPr>
+            <a:picLocks noChangeAspect="1"/>
+          </p:cNvPicPr>
+          <p:nvPr/>
+        </p:nvPicPr>
+        <p:blipFill>
+          <a:blip r:embed="rId4"/>
+          <a:stretch>
+            <a:fillRect/>
+          </a:stretch>
+        </p:blipFill>
+        <p:spPr>
+          <a:xfrm>
+            <a:off x="444061" y="4076144"/>
+            <a:ext cx="5608808" cy="1691787"/>
+          </a:xfrm>
+          <a:prstGeom prst="rect">
+            <a:avLst/>
+          </a:prstGeom>
+        </p:spPr>
+      </p:pic>
+      <p:pic>
+        <p:nvPicPr>
+          <p:cNvPr id="11" name="图片 10">
+            <a:extLst>
+              <a:ext uri="{FF2B5EF4-FFF2-40B4-BE49-F238E27FC236}">
+                <a16:creationId xmlns:a16="http://schemas.microsoft.com/office/drawing/2014/main" id="{C2918D6E-06CA-F59C-CF97-37DAE03C139B}"/>
+              </a:ext>
+            </a:extLst>
+          </p:cNvPr>
+          <p:cNvPicPr>
+            <a:picLocks noChangeAspect="1"/>
+          </p:cNvPicPr>
+          <p:nvPr/>
+        </p:nvPicPr>
+        <p:blipFill>
+          <a:blip r:embed="rId5"/>
+          <a:stretch>
+            <a:fillRect/>
+          </a:stretch>
+        </p:blipFill>
+        <p:spPr>
+          <a:xfrm>
+            <a:off x="6252470" y="3904712"/>
+            <a:ext cx="5380192" cy="2012869"/>
+          </a:xfrm>
+          <a:prstGeom prst="rect">
+            <a:avLst/>
+          </a:prstGeom>
+        </p:spPr>
+      </p:pic>
+      <p:cxnSp>
+        <p:nvCxnSpPr>
+          <p:cNvPr id="13" name="直接连接符 12">
+            <a:extLst>
+              <a:ext uri="{FF2B5EF4-FFF2-40B4-BE49-F238E27FC236}">
+                <a16:creationId xmlns:a16="http://schemas.microsoft.com/office/drawing/2014/main" id="{E66431EE-6100-2F69-531A-4AB6EEF04BA8}"/>
+              </a:ext>
+            </a:extLst>
+          </p:cNvPr>
+          <p:cNvCxnSpPr/>
+          <p:nvPr/>
+        </p:nvCxnSpPr>
+        <p:spPr>
+          <a:xfrm>
+            <a:off x="444061" y="3840480"/>
+            <a:ext cx="10978319" cy="0"/>
+          </a:xfrm>
+          <a:prstGeom prst="line">
+            <a:avLst/>
+          </a:prstGeom>
+          <a:ln w="28575">
+            <a:solidFill>
+              <a:schemeClr val="tx1"/>
+            </a:solidFill>
+            <a:prstDash val="dash"/>
+          </a:ln>
+        </p:spPr>
+        <p:style>
+          <a:lnRef idx="1">
+            <a:schemeClr val="accent1"/>
+          </a:lnRef>
+          <a:fillRef idx="0">
+            <a:schemeClr val="accent1"/>
+          </a:fillRef>
+          <a:effectRef idx="0">
+            <a:schemeClr val="accent1"/>
+          </a:effectRef>
+          <a:fontRef idx="minor">
+            <a:schemeClr val="tx1"/>
+          </a:fontRef>
+        </p:style>
+      </p:cxnSp>
+      <p:cxnSp>
+        <p:nvCxnSpPr>
+          <p:cNvPr id="14" name="直接连接符 13">
+            <a:extLst>
+              <a:ext uri="{FF2B5EF4-FFF2-40B4-BE49-F238E27FC236}">
+                <a16:creationId xmlns:a16="http://schemas.microsoft.com/office/drawing/2014/main" id="{0911BED8-8BF7-AAFD-DB32-8CB813C8EDC3}"/>
+              </a:ext>
+            </a:extLst>
+          </p:cNvPr>
+          <p:cNvCxnSpPr>
+            <a:cxnSpLocks/>
+          </p:cNvCxnSpPr>
+          <p:nvPr/>
+        </p:nvCxnSpPr>
+        <p:spPr>
+          <a:xfrm>
+            <a:off x="6152669" y="525780"/>
+            <a:ext cx="0" cy="5456033"/>
+          </a:xfrm>
+          <a:prstGeom prst="line">
+            <a:avLst/>
+          </a:prstGeom>
+          <a:ln w="28575">
+            <a:solidFill>
+              <a:schemeClr val="tx1"/>
+            </a:solidFill>
+            <a:prstDash val="dash"/>
+          </a:ln>
+        </p:spPr>
+        <p:style>
+          <a:lnRef idx="1">
+            <a:schemeClr val="accent1"/>
+          </a:lnRef>
+          <a:fillRef idx="0">
+            <a:schemeClr val="accent1"/>
+          </a:fillRef>
+          <a:effectRef idx="0">
+            <a:schemeClr val="accent1"/>
+          </a:effectRef>
+          <a:fontRef idx="minor">
+            <a:schemeClr val="tx1"/>
+          </a:fontRef>
+        </p:style>
+      </p:cxnSp>
+    </p:spTree>
+    <p:extLst>
+      <p:ext uri="{BB962C8B-B14F-4D97-AF65-F5344CB8AC3E}">
+        <p14:creationId xmlns:p14="http://schemas.microsoft.com/office/powerpoint/2010/main" val="2436335033"/>
       </p:ext>
     </p:extLst>
   </p:cSld>

</xml_diff>